<commit_message>
Added two system interaction diagrams, ostensibly finishing the PDA.
</commit_message>
<xml_diff>
--- a/diagrams.pptx
+++ b/diagrams.pptx
@@ -4,8 +4,13 @@
   <p:sldMasterIdLst>
     <p:sldMasterId id="2147483648" r:id="rId1"/>
   </p:sldMasterIdLst>
+  <p:notesMasterIdLst>
+    <p:notesMasterId r:id="rId5"/>
+  </p:notesMasterIdLst>
   <p:sldIdLst>
     <p:sldId id="256" r:id="rId2"/>
+    <p:sldId id="257" r:id="rId3"/>
+    <p:sldId id="258" r:id="rId4"/>
   </p:sldIdLst>
   <p:sldSz cx="12192000" cy="6858000"/>
   <p:notesSz cx="6858000" cy="9144000"/>
@@ -104,7 +109,446 @@
       </a:defRPr>
     </a:lvl9pPr>
   </p:defaultTextStyle>
+  <p:extLst>
+    <p:ext uri="{EFAFB233-063F-42B5-8137-9DF3F51BA10A}">
+      <p15:sldGuideLst xmlns:p15="http://schemas.microsoft.com/office/powerpoint/2012/main"/>
+    </p:ext>
+  </p:extLst>
 </p:presentation>
+</file>
+
+<file path=ppt/notesMasters/notesMaster1.xml><?xml version="1.0" encoding="utf-8"?>
+<p:notesMaster xmlns:a="http://schemas.openxmlformats.org/drawingml/2006/main" xmlns:r="http://schemas.openxmlformats.org/officeDocument/2006/relationships" xmlns:p="http://schemas.openxmlformats.org/presentationml/2006/main">
+  <p:cSld>
+    <p:bg>
+      <p:bgRef idx="1001">
+        <a:schemeClr val="bg1"/>
+      </p:bgRef>
+    </p:bg>
+    <p:spTree>
+      <p:nvGrpSpPr>
+        <p:cNvPr id="1" name=""/>
+        <p:cNvGrpSpPr/>
+        <p:nvPr/>
+      </p:nvGrpSpPr>
+      <p:grpSpPr>
+        <a:xfrm>
+          <a:off x="0" y="0"/>
+          <a:ext cx="0" cy="0"/>
+          <a:chOff x="0" y="0"/>
+          <a:chExt cx="0" cy="0"/>
+        </a:xfrm>
+      </p:grpSpPr>
+      <p:sp>
+        <p:nvSpPr>
+          <p:cNvPr id="2" name="Header Placeholder 1"/>
+          <p:cNvSpPr>
+            <a:spLocks noGrp="1"/>
+          </p:cNvSpPr>
+          <p:nvPr>
+            <p:ph type="hdr" sz="quarter"/>
+          </p:nvPr>
+        </p:nvSpPr>
+        <p:spPr>
+          <a:xfrm>
+            <a:off x="0" y="0"/>
+            <a:ext cx="2971800" cy="458788"/>
+          </a:xfrm>
+          <a:prstGeom prst="rect">
+            <a:avLst/>
+          </a:prstGeom>
+        </p:spPr>
+        <p:txBody>
+          <a:bodyPr vert="horz" lIns="91440" tIns="45720" rIns="91440" bIns="45720" rtlCol="0"/>
+          <a:lstStyle>
+            <a:lvl1pPr algn="l">
+              <a:defRPr sz="1200"/>
+            </a:lvl1pPr>
+          </a:lstStyle>
+          <a:p>
+            <a:endParaRPr lang="en-GB"/>
+          </a:p>
+        </p:txBody>
+      </p:sp>
+      <p:sp>
+        <p:nvSpPr>
+          <p:cNvPr id="3" name="Date Placeholder 2"/>
+          <p:cNvSpPr>
+            <a:spLocks noGrp="1"/>
+          </p:cNvSpPr>
+          <p:nvPr>
+            <p:ph type="dt" idx="1"/>
+          </p:nvPr>
+        </p:nvSpPr>
+        <p:spPr>
+          <a:xfrm>
+            <a:off x="3884613" y="0"/>
+            <a:ext cx="2971800" cy="458788"/>
+          </a:xfrm>
+          <a:prstGeom prst="rect">
+            <a:avLst/>
+          </a:prstGeom>
+        </p:spPr>
+        <p:txBody>
+          <a:bodyPr vert="horz" lIns="91440" tIns="45720" rIns="91440" bIns="45720" rtlCol="0"/>
+          <a:lstStyle>
+            <a:lvl1pPr algn="r">
+              <a:defRPr sz="1200"/>
+            </a:lvl1pPr>
+          </a:lstStyle>
+          <a:p>
+            <a:fld id="{D7F2DD01-C4E8-FE4D-B499-E5F200DF68B4}" type="datetimeFigureOut">
+              <a:rPr lang="en-GB" smtClean="0"/>
+              <a:t>13/02/2019</a:t>
+            </a:fld>
+            <a:endParaRPr lang="en-GB"/>
+          </a:p>
+        </p:txBody>
+      </p:sp>
+      <p:sp>
+        <p:nvSpPr>
+          <p:cNvPr id="4" name="Slide Image Placeholder 3"/>
+          <p:cNvSpPr>
+            <a:spLocks noGrp="1" noRot="1" noChangeAspect="1"/>
+          </p:cNvSpPr>
+          <p:nvPr>
+            <p:ph type="sldImg" idx="2"/>
+          </p:nvPr>
+        </p:nvSpPr>
+        <p:spPr>
+          <a:xfrm>
+            <a:off x="685800" y="1143000"/>
+            <a:ext cx="5486400" cy="3086100"/>
+          </a:xfrm>
+          <a:prstGeom prst="rect">
+            <a:avLst/>
+          </a:prstGeom>
+          <a:noFill/>
+          <a:ln w="12700">
+            <a:solidFill>
+              <a:prstClr val="black"/>
+            </a:solidFill>
+          </a:ln>
+        </p:spPr>
+        <p:txBody>
+          <a:bodyPr vert="horz" lIns="91440" tIns="45720" rIns="91440" bIns="45720" rtlCol="0" anchor="ctr"/>
+          <a:lstStyle/>
+          <a:p>
+            <a:endParaRPr lang="en-GB"/>
+          </a:p>
+        </p:txBody>
+      </p:sp>
+      <p:sp>
+        <p:nvSpPr>
+          <p:cNvPr id="5" name="Notes Placeholder 4"/>
+          <p:cNvSpPr>
+            <a:spLocks noGrp="1"/>
+          </p:cNvSpPr>
+          <p:nvPr>
+            <p:ph type="body" sz="quarter" idx="3"/>
+          </p:nvPr>
+        </p:nvSpPr>
+        <p:spPr>
+          <a:xfrm>
+            <a:off x="685800" y="4400550"/>
+            <a:ext cx="5486400" cy="3600450"/>
+          </a:xfrm>
+          <a:prstGeom prst="rect">
+            <a:avLst/>
+          </a:prstGeom>
+        </p:spPr>
+        <p:txBody>
+          <a:bodyPr vert="horz" lIns="91440" tIns="45720" rIns="91440" bIns="45720" rtlCol="0"/>
+          <a:lstStyle/>
+          <a:p>
+            <a:pPr lvl="0"/>
+            <a:r>
+              <a:rPr lang="en-US" smtClean="0"/>
+              <a:t>Click to edit Master text styles</a:t>
+            </a:r>
+          </a:p>
+          <a:p>
+            <a:pPr lvl="1"/>
+            <a:r>
+              <a:rPr lang="en-US" smtClean="0"/>
+              <a:t>Second level</a:t>
+            </a:r>
+          </a:p>
+          <a:p>
+            <a:pPr lvl="2"/>
+            <a:r>
+              <a:rPr lang="en-US" smtClean="0"/>
+              <a:t>Third level</a:t>
+            </a:r>
+          </a:p>
+          <a:p>
+            <a:pPr lvl="3"/>
+            <a:r>
+              <a:rPr lang="en-US" smtClean="0"/>
+              <a:t>Fourth level</a:t>
+            </a:r>
+          </a:p>
+          <a:p>
+            <a:pPr lvl="4"/>
+            <a:r>
+              <a:rPr lang="en-US" smtClean="0"/>
+              <a:t>Fifth level</a:t>
+            </a:r>
+            <a:endParaRPr lang="en-GB"/>
+          </a:p>
+        </p:txBody>
+      </p:sp>
+      <p:sp>
+        <p:nvSpPr>
+          <p:cNvPr id="6" name="Footer Placeholder 5"/>
+          <p:cNvSpPr>
+            <a:spLocks noGrp="1"/>
+          </p:cNvSpPr>
+          <p:nvPr>
+            <p:ph type="ftr" sz="quarter" idx="4"/>
+          </p:nvPr>
+        </p:nvSpPr>
+        <p:spPr>
+          <a:xfrm>
+            <a:off x="0" y="8685213"/>
+            <a:ext cx="2971800" cy="458787"/>
+          </a:xfrm>
+          <a:prstGeom prst="rect">
+            <a:avLst/>
+          </a:prstGeom>
+        </p:spPr>
+        <p:txBody>
+          <a:bodyPr vert="horz" lIns="91440" tIns="45720" rIns="91440" bIns="45720" rtlCol="0" anchor="b"/>
+          <a:lstStyle>
+            <a:lvl1pPr algn="l">
+              <a:defRPr sz="1200"/>
+            </a:lvl1pPr>
+          </a:lstStyle>
+          <a:p>
+            <a:endParaRPr lang="en-GB"/>
+          </a:p>
+        </p:txBody>
+      </p:sp>
+      <p:sp>
+        <p:nvSpPr>
+          <p:cNvPr id="7" name="Slide Number Placeholder 6"/>
+          <p:cNvSpPr>
+            <a:spLocks noGrp="1"/>
+          </p:cNvSpPr>
+          <p:nvPr>
+            <p:ph type="sldNum" sz="quarter" idx="5"/>
+          </p:nvPr>
+        </p:nvSpPr>
+        <p:spPr>
+          <a:xfrm>
+            <a:off x="3884613" y="8685213"/>
+            <a:ext cx="2971800" cy="458787"/>
+          </a:xfrm>
+          <a:prstGeom prst="rect">
+            <a:avLst/>
+          </a:prstGeom>
+        </p:spPr>
+        <p:txBody>
+          <a:bodyPr vert="horz" lIns="91440" tIns="45720" rIns="91440" bIns="45720" rtlCol="0" anchor="b"/>
+          <a:lstStyle>
+            <a:lvl1pPr algn="r">
+              <a:defRPr sz="1200"/>
+            </a:lvl1pPr>
+          </a:lstStyle>
+          <a:p>
+            <a:fld id="{FF944C6A-C19A-244B-8E9D-A76C4FA4EE0B}" type="slidenum">
+              <a:rPr lang="en-GB" smtClean="0"/>
+              <a:t>‹#›</a:t>
+            </a:fld>
+            <a:endParaRPr lang="en-GB"/>
+          </a:p>
+        </p:txBody>
+      </p:sp>
+    </p:spTree>
+    <p:extLst>
+      <p:ext uri="{BB962C8B-B14F-4D97-AF65-F5344CB8AC3E}">
+        <p14:creationId xmlns:p14="http://schemas.microsoft.com/office/powerpoint/2010/main" val="1626486362"/>
+      </p:ext>
+    </p:extLst>
+  </p:cSld>
+  <p:clrMap bg1="lt1" tx1="dk1" bg2="lt2" tx2="dk2" accent1="accent1" accent2="accent2" accent3="accent3" accent4="accent4" accent5="accent5" accent6="accent6" hlink="hlink" folHlink="folHlink"/>
+  <p:notesStyle>
+    <a:lvl1pPr marL="0" algn="l" defTabSz="914400" rtl="0" eaLnBrk="1" latinLnBrk="0" hangingPunct="1">
+      <a:defRPr sz="1200" kern="1200">
+        <a:solidFill>
+          <a:schemeClr val="tx1"/>
+        </a:solidFill>
+        <a:latin typeface="+mn-lt"/>
+        <a:ea typeface="+mn-ea"/>
+        <a:cs typeface="+mn-cs"/>
+      </a:defRPr>
+    </a:lvl1pPr>
+    <a:lvl2pPr marL="457200" algn="l" defTabSz="914400" rtl="0" eaLnBrk="1" latinLnBrk="0" hangingPunct="1">
+      <a:defRPr sz="1200" kern="1200">
+        <a:solidFill>
+          <a:schemeClr val="tx1"/>
+        </a:solidFill>
+        <a:latin typeface="+mn-lt"/>
+        <a:ea typeface="+mn-ea"/>
+        <a:cs typeface="+mn-cs"/>
+      </a:defRPr>
+    </a:lvl2pPr>
+    <a:lvl3pPr marL="914400" algn="l" defTabSz="914400" rtl="0" eaLnBrk="1" latinLnBrk="0" hangingPunct="1">
+      <a:defRPr sz="1200" kern="1200">
+        <a:solidFill>
+          <a:schemeClr val="tx1"/>
+        </a:solidFill>
+        <a:latin typeface="+mn-lt"/>
+        <a:ea typeface="+mn-ea"/>
+        <a:cs typeface="+mn-cs"/>
+      </a:defRPr>
+    </a:lvl3pPr>
+    <a:lvl4pPr marL="1371600" algn="l" defTabSz="914400" rtl="0" eaLnBrk="1" latinLnBrk="0" hangingPunct="1">
+      <a:defRPr sz="1200" kern="1200">
+        <a:solidFill>
+          <a:schemeClr val="tx1"/>
+        </a:solidFill>
+        <a:latin typeface="+mn-lt"/>
+        <a:ea typeface="+mn-ea"/>
+        <a:cs typeface="+mn-cs"/>
+      </a:defRPr>
+    </a:lvl4pPr>
+    <a:lvl5pPr marL="1828800" algn="l" defTabSz="914400" rtl="0" eaLnBrk="1" latinLnBrk="0" hangingPunct="1">
+      <a:defRPr sz="1200" kern="1200">
+        <a:solidFill>
+          <a:schemeClr val="tx1"/>
+        </a:solidFill>
+        <a:latin typeface="+mn-lt"/>
+        <a:ea typeface="+mn-ea"/>
+        <a:cs typeface="+mn-cs"/>
+      </a:defRPr>
+    </a:lvl5pPr>
+    <a:lvl6pPr marL="2286000" algn="l" defTabSz="914400" rtl="0" eaLnBrk="1" latinLnBrk="0" hangingPunct="1">
+      <a:defRPr sz="1200" kern="1200">
+        <a:solidFill>
+          <a:schemeClr val="tx1"/>
+        </a:solidFill>
+        <a:latin typeface="+mn-lt"/>
+        <a:ea typeface="+mn-ea"/>
+        <a:cs typeface="+mn-cs"/>
+      </a:defRPr>
+    </a:lvl6pPr>
+    <a:lvl7pPr marL="2743200" algn="l" defTabSz="914400" rtl="0" eaLnBrk="1" latinLnBrk="0" hangingPunct="1">
+      <a:defRPr sz="1200" kern="1200">
+        <a:solidFill>
+          <a:schemeClr val="tx1"/>
+        </a:solidFill>
+        <a:latin typeface="+mn-lt"/>
+        <a:ea typeface="+mn-ea"/>
+        <a:cs typeface="+mn-cs"/>
+      </a:defRPr>
+    </a:lvl7pPr>
+    <a:lvl8pPr marL="3200400" algn="l" defTabSz="914400" rtl="0" eaLnBrk="1" latinLnBrk="0" hangingPunct="1">
+      <a:defRPr sz="1200" kern="1200">
+        <a:solidFill>
+          <a:schemeClr val="tx1"/>
+        </a:solidFill>
+        <a:latin typeface="+mn-lt"/>
+        <a:ea typeface="+mn-ea"/>
+        <a:cs typeface="+mn-cs"/>
+      </a:defRPr>
+    </a:lvl8pPr>
+    <a:lvl9pPr marL="3657600" algn="l" defTabSz="914400" rtl="0" eaLnBrk="1" latinLnBrk="0" hangingPunct="1">
+      <a:defRPr sz="1200" kern="1200">
+        <a:solidFill>
+          <a:schemeClr val="tx1"/>
+        </a:solidFill>
+        <a:latin typeface="+mn-lt"/>
+        <a:ea typeface="+mn-ea"/>
+        <a:cs typeface="+mn-cs"/>
+      </a:defRPr>
+    </a:lvl9pPr>
+  </p:notesStyle>
+</p:notesMaster>
+</file>
+
+<file path=ppt/notesSlides/notesSlide1.xml><?xml version="1.0" encoding="utf-8"?>
+<p:notes xmlns:a="http://schemas.openxmlformats.org/drawingml/2006/main" xmlns:r="http://schemas.openxmlformats.org/officeDocument/2006/relationships" xmlns:p="http://schemas.openxmlformats.org/presentationml/2006/main">
+  <p:cSld>
+    <p:spTree>
+      <p:nvGrpSpPr>
+        <p:cNvPr id="1" name=""/>
+        <p:cNvGrpSpPr/>
+        <p:nvPr/>
+      </p:nvGrpSpPr>
+      <p:grpSpPr>
+        <a:xfrm>
+          <a:off x="0" y="0"/>
+          <a:ext cx="0" cy="0"/>
+          <a:chOff x="0" y="0"/>
+          <a:chExt cx="0" cy="0"/>
+        </a:xfrm>
+      </p:grpSpPr>
+      <p:sp>
+        <p:nvSpPr>
+          <p:cNvPr id="2" name="Slide Image Placeholder 1"/>
+          <p:cNvSpPr>
+            <a:spLocks noGrp="1" noRot="1" noChangeAspect="1"/>
+          </p:cNvSpPr>
+          <p:nvPr>
+            <p:ph type="sldImg"/>
+          </p:nvPr>
+        </p:nvSpPr>
+        <p:spPr/>
+      </p:sp>
+      <p:sp>
+        <p:nvSpPr>
+          <p:cNvPr id="3" name="Notes Placeholder 2"/>
+          <p:cNvSpPr>
+            <a:spLocks noGrp="1"/>
+          </p:cNvSpPr>
+          <p:nvPr>
+            <p:ph type="body" idx="1"/>
+          </p:nvPr>
+        </p:nvSpPr>
+        <p:spPr/>
+        <p:txBody>
+          <a:bodyPr/>
+          <a:lstStyle/>
+          <a:p>
+            <a:endParaRPr lang="en-GB" dirty="0"/>
+          </a:p>
+        </p:txBody>
+      </p:sp>
+      <p:sp>
+        <p:nvSpPr>
+          <p:cNvPr id="4" name="Slide Number Placeholder 3"/>
+          <p:cNvSpPr>
+            <a:spLocks noGrp="1"/>
+          </p:cNvSpPr>
+          <p:nvPr>
+            <p:ph type="sldNum" sz="quarter" idx="10"/>
+          </p:nvPr>
+        </p:nvSpPr>
+        <p:spPr/>
+        <p:txBody>
+          <a:bodyPr/>
+          <a:lstStyle/>
+          <a:p>
+            <a:fld id="{FF944C6A-C19A-244B-8E9D-A76C4FA4EE0B}" type="slidenum">
+              <a:rPr lang="en-GB" smtClean="0"/>
+              <a:t>1</a:t>
+            </a:fld>
+            <a:endParaRPr lang="en-GB"/>
+          </a:p>
+        </p:txBody>
+      </p:sp>
+    </p:spTree>
+    <p:extLst>
+      <p:ext uri="{BB962C8B-B14F-4D97-AF65-F5344CB8AC3E}">
+        <p14:creationId xmlns:p14="http://schemas.microsoft.com/office/powerpoint/2010/main" val="1036943471"/>
+      </p:ext>
+    </p:extLst>
+  </p:cSld>
+  <p:clrMapOvr>
+    <a:masterClrMapping/>
+  </p:clrMapOvr>
+</p:notes>
 </file>
 
 <file path=ppt/slideLayouts/slideLayout1.xml><?xml version="1.0" encoding="utf-8"?>
@@ -238,7 +682,7 @@
           <a:p>
             <a:fld id="{C184E966-F4DC-1F4D-A8C7-6DE973F79644}" type="datetimeFigureOut">
               <a:rPr lang="en-GB" smtClean="0"/>
-              <a:t>21/01/2019</a:t>
+              <a:t>11/02/2019</a:t>
             </a:fld>
             <a:endParaRPr lang="en-GB"/>
           </a:p>
@@ -408,7 +852,7 @@
           <a:p>
             <a:fld id="{C184E966-F4DC-1F4D-A8C7-6DE973F79644}" type="datetimeFigureOut">
               <a:rPr lang="en-GB" smtClean="0"/>
-              <a:t>21/01/2019</a:t>
+              <a:t>11/02/2019</a:t>
             </a:fld>
             <a:endParaRPr lang="en-GB"/>
           </a:p>
@@ -588,7 +1032,7 @@
           <a:p>
             <a:fld id="{C184E966-F4DC-1F4D-A8C7-6DE973F79644}" type="datetimeFigureOut">
               <a:rPr lang="en-GB" smtClean="0"/>
-              <a:t>21/01/2019</a:t>
+              <a:t>11/02/2019</a:t>
             </a:fld>
             <a:endParaRPr lang="en-GB"/>
           </a:p>
@@ -758,7 +1202,7 @@
           <a:p>
             <a:fld id="{C184E966-F4DC-1F4D-A8C7-6DE973F79644}" type="datetimeFigureOut">
               <a:rPr lang="en-GB" smtClean="0"/>
-              <a:t>21/01/2019</a:t>
+              <a:t>11/02/2019</a:t>
             </a:fld>
             <a:endParaRPr lang="en-GB"/>
           </a:p>
@@ -1004,7 +1448,7 @@
           <a:p>
             <a:fld id="{C184E966-F4DC-1F4D-A8C7-6DE973F79644}" type="datetimeFigureOut">
               <a:rPr lang="en-GB" smtClean="0"/>
-              <a:t>21/01/2019</a:t>
+              <a:t>11/02/2019</a:t>
             </a:fld>
             <a:endParaRPr lang="en-GB"/>
           </a:p>
@@ -1236,7 +1680,7 @@
           <a:p>
             <a:fld id="{C184E966-F4DC-1F4D-A8C7-6DE973F79644}" type="datetimeFigureOut">
               <a:rPr lang="en-GB" smtClean="0"/>
-              <a:t>21/01/2019</a:t>
+              <a:t>11/02/2019</a:t>
             </a:fld>
             <a:endParaRPr lang="en-GB"/>
           </a:p>
@@ -1603,7 +2047,7 @@
           <a:p>
             <a:fld id="{C184E966-F4DC-1F4D-A8C7-6DE973F79644}" type="datetimeFigureOut">
               <a:rPr lang="en-GB" smtClean="0"/>
-              <a:t>21/01/2019</a:t>
+              <a:t>11/02/2019</a:t>
             </a:fld>
             <a:endParaRPr lang="en-GB"/>
           </a:p>
@@ -1721,7 +2165,7 @@
           <a:p>
             <a:fld id="{C184E966-F4DC-1F4D-A8C7-6DE973F79644}" type="datetimeFigureOut">
               <a:rPr lang="en-GB" smtClean="0"/>
-              <a:t>21/01/2019</a:t>
+              <a:t>11/02/2019</a:t>
             </a:fld>
             <a:endParaRPr lang="en-GB"/>
           </a:p>
@@ -1816,7 +2260,7 @@
           <a:p>
             <a:fld id="{C184E966-F4DC-1F4D-A8C7-6DE973F79644}" type="datetimeFigureOut">
               <a:rPr lang="en-GB" smtClean="0"/>
-              <a:t>21/01/2019</a:t>
+              <a:t>11/02/2019</a:t>
             </a:fld>
             <a:endParaRPr lang="en-GB"/>
           </a:p>
@@ -2093,7 +2537,7 @@
           <a:p>
             <a:fld id="{C184E966-F4DC-1F4D-A8C7-6DE973F79644}" type="datetimeFigureOut">
               <a:rPr lang="en-GB" smtClean="0"/>
-              <a:t>21/01/2019</a:t>
+              <a:t>11/02/2019</a:t>
             </a:fld>
             <a:endParaRPr lang="en-GB"/>
           </a:p>
@@ -2346,7 +2790,7 @@
           <a:p>
             <a:fld id="{C184E966-F4DC-1F4D-A8C7-6DE973F79644}" type="datetimeFigureOut">
               <a:rPr lang="en-GB" smtClean="0"/>
-              <a:t>21/01/2019</a:t>
+              <a:t>11/02/2019</a:t>
             </a:fld>
             <a:endParaRPr lang="en-GB"/>
           </a:p>
@@ -2559,7 +3003,7 @@
           <a:p>
             <a:fld id="{C184E966-F4DC-1F4D-A8C7-6DE973F79644}" type="datetimeFigureOut">
               <a:rPr lang="en-GB" smtClean="0"/>
-              <a:t>21/01/2019</a:t>
+              <a:t>11/02/2019</a:t>
             </a:fld>
             <a:endParaRPr lang="en-GB"/>
           </a:p>
@@ -2973,7 +3417,7 @@
         <p:spPr>
           <a:xfrm>
             <a:off x="2528888" y="342901"/>
-            <a:ext cx="5600700" cy="6172200"/>
+            <a:ext cx="5600700" cy="4892646"/>
           </a:xfrm>
           <a:prstGeom prst="roundRect">
             <a:avLst>
@@ -3051,7 +3495,7 @@
         </p:nvSpPr>
         <p:spPr>
           <a:xfrm>
-            <a:off x="3042605" y="389802"/>
+            <a:off x="2903123" y="389802"/>
             <a:ext cx="4855222" cy="369332"/>
           </a:xfrm>
           <a:prstGeom prst="rect">
@@ -3065,9 +3509,14 @@
           </a:bodyPr>
           <a:lstStyle/>
           <a:p>
+            <a:pPr algn="ctr"/>
             <a:r>
               <a:rPr lang="en-GB" b="1" dirty="0" smtClean="0"/>
-              <a:t>Employee adds stock item to inventory system</a:t>
+              <a:t>Employee </a:t>
+            </a:r>
+            <a:r>
+              <a:rPr lang="en-GB" b="1" dirty="0" smtClean="0"/>
+              <a:t>updates stock in inventory</a:t>
             </a:r>
             <a:endParaRPr lang="en-GB" b="1" dirty="0"/>
           </a:p>
@@ -3082,7 +3531,7 @@
         <p:spPr>
           <a:xfrm>
             <a:off x="5008207" y="791502"/>
-            <a:ext cx="0" cy="5723599"/>
+            <a:ext cx="0" cy="4444045"/>
           </a:xfrm>
           <a:prstGeom prst="line">
             <a:avLst/>
@@ -3187,9 +3636,14 @@
           </a:bodyPr>
           <a:lstStyle/>
           <a:p>
+            <a:pPr algn="ctr"/>
             <a:r>
               <a:rPr lang="en-GB" sz="1200" b="1" dirty="0" smtClean="0"/>
-              <a:t>2. Inventory Management App</a:t>
+              <a:t>2. Inventory </a:t>
+            </a:r>
+            <a:r>
+              <a:rPr lang="en-GB" sz="1200" b="1" dirty="0" smtClean="0"/>
+              <a:t>System</a:t>
             </a:r>
             <a:endParaRPr lang="en-GB" sz="1200" b="1" dirty="0"/>
           </a:p>
@@ -3245,7 +3699,7 @@
                   <a:sysClr val="windowText" lastClr="000000"/>
                 </a:solidFill>
               </a:rPr>
-              <a:t>Click add gift button</a:t>
+              <a:t>Provide product name</a:t>
             </a:r>
             <a:endParaRPr lang="en-GB" sz="1200" dirty="0">
               <a:solidFill>
@@ -3305,7 +3759,7 @@
                   <a:sysClr val="windowText" lastClr="000000"/>
                 </a:solidFill>
               </a:rPr>
-              <a:t>Route to create gift page, present html form.</a:t>
+              <a:t>Check for existing product entry</a:t>
             </a:r>
             <a:endParaRPr lang="en-GB" sz="1200" dirty="0">
               <a:solidFill>
@@ -3443,7 +3897,7 @@
         </p:nvSpPr>
         <p:spPr>
           <a:xfrm>
-            <a:off x="2995460" y="2771821"/>
+            <a:off x="2992512" y="2360501"/>
             <a:ext cx="1546175" cy="466530"/>
           </a:xfrm>
           <a:prstGeom prst="roundRect">
@@ -3485,23 +3939,7 @@
                   <a:sysClr val="windowText" lastClr="000000"/>
                 </a:solidFill>
               </a:rPr>
-              <a:t>Complete </a:t>
-            </a:r>
-            <a:r>
-              <a:rPr lang="en-GB" sz="1200" dirty="0">
-                <a:solidFill>
-                  <a:sysClr val="windowText" lastClr="000000"/>
-                </a:solidFill>
-              </a:rPr>
-              <a:t>f</a:t>
-            </a:r>
-            <a:r>
-              <a:rPr lang="en-GB" sz="1200" dirty="0" smtClean="0">
-                <a:solidFill>
-                  <a:sysClr val="windowText" lastClr="000000"/>
-                </a:solidFill>
-              </a:rPr>
-              <a:t>orm fields, click submit</a:t>
+              <a:t>Provide product details</a:t>
             </a:r>
             <a:endParaRPr lang="en-GB" sz="1200" dirty="0">
               <a:solidFill>
@@ -3515,18 +3953,20 @@
         <p:nvCxnSpPr>
           <p:cNvPr id="26" name="Elbow Connector 25"/>
           <p:cNvCxnSpPr>
-            <a:stCxn id="16" idx="2"/>
-            <a:endCxn id="24" idx="0"/>
+            <a:stCxn id="35" idx="2"/>
+            <a:endCxn id="48" idx="0"/>
           </p:cNvCxnSpPr>
           <p:nvPr/>
         </p:nvCxnSpPr>
         <p:spPr>
           <a:xfrm rot="5400000">
-            <a:off x="4855833" y="1058756"/>
-            <a:ext cx="625780" cy="2800350"/>
+            <a:off x="4869137" y="1642887"/>
+            <a:ext cx="596225" cy="2803298"/>
           </a:xfrm>
           <a:prstGeom prst="bentConnector3">
-            <a:avLst/>
+            <a:avLst>
+              <a:gd name="adj1" fmla="val 50000"/>
+            </a:avLst>
           </a:prstGeom>
           <a:ln>
             <a:tailEnd type="triangle" w="lg" len="lg"/>
@@ -3549,19 +3989,17 @@
       </p:cxnSp>
       <p:sp>
         <p:nvSpPr>
-          <p:cNvPr id="31" name="Rounded Rectangle 30"/>
+          <p:cNvPr id="35" name="Diamond 34"/>
           <p:cNvSpPr/>
           <p:nvPr/>
         </p:nvSpPr>
         <p:spPr>
           <a:xfrm>
-            <a:off x="5558506" y="4246059"/>
-            <a:ext cx="2020783" cy="466530"/>
-          </a:xfrm>
-          <a:prstGeom prst="roundRect">
-            <a:avLst>
-              <a:gd name="adj" fmla="val 50000"/>
-            </a:avLst>
+            <a:off x="6295354" y="2448470"/>
+            <a:ext cx="547087" cy="297954"/>
+          </a:xfrm>
+          <a:prstGeom prst="diamond">
+            <a:avLst/>
           </a:prstGeom>
           <a:noFill/>
           <a:ln>
@@ -3591,40 +4029,291 @@
           <a:lstStyle/>
           <a:p>
             <a:pPr algn="ctr"/>
-            <a:r>
-              <a:rPr lang="en-GB" sz="1200" dirty="0" smtClean="0">
-                <a:solidFill>
-                  <a:sysClr val="windowText" lastClr="000000"/>
-                </a:solidFill>
-              </a:rPr>
-              <a:t>Save form entries to </a:t>
-            </a:r>
-            <a:r>
-              <a:rPr lang="en-GB" sz="1200" smtClean="0">
-                <a:solidFill>
-                  <a:sysClr val="windowText" lastClr="000000"/>
-                </a:solidFill>
-              </a:rPr>
-              <a:t>SQL database</a:t>
-            </a:r>
-            <a:endParaRPr lang="en-GB" sz="1200" dirty="0">
+            <a:endParaRPr lang="en-GB"/>
+          </a:p>
+        </p:txBody>
+      </p:sp>
+      <p:grpSp>
+        <p:nvGrpSpPr>
+          <p:cNvPr id="2" name="Group 1"/>
+          <p:cNvGrpSpPr/>
+          <p:nvPr/>
+        </p:nvGrpSpPr>
+        <p:grpSpPr>
+          <a:xfrm>
+            <a:off x="2570488" y="2490579"/>
+            <a:ext cx="206374" cy="206374"/>
+            <a:chOff x="6424897" y="5833699"/>
+            <a:chExt cx="288000" cy="288000"/>
+          </a:xfrm>
+        </p:grpSpPr>
+        <p:sp>
+          <p:nvSpPr>
+            <p:cNvPr id="45" name="Oval 44"/>
+            <p:cNvSpPr/>
+            <p:nvPr/>
+          </p:nvSpPr>
+          <p:spPr>
+            <a:xfrm>
+              <a:off x="6460897" y="5869699"/>
+              <a:ext cx="216000" cy="216000"/>
+            </a:xfrm>
+            <a:prstGeom prst="ellipse">
+              <a:avLst/>
+            </a:prstGeom>
+            <a:solidFill>
+              <a:schemeClr val="tx1"/>
+            </a:solidFill>
+            <a:ln>
               <a:solidFill>
-                <a:sysClr val="windowText" lastClr="000000"/>
+                <a:schemeClr val="tx1"/>
               </a:solidFill>
-            </a:endParaRPr>
-          </a:p>
-        </p:txBody>
-      </p:sp>
-      <p:sp>
-        <p:nvSpPr>
-          <p:cNvPr id="32" name="Rounded Rectangle 31"/>
+            </a:ln>
+          </p:spPr>
+          <p:style>
+            <a:lnRef idx="2">
+              <a:schemeClr val="accent1">
+                <a:shade val="50000"/>
+              </a:schemeClr>
+            </a:lnRef>
+            <a:fillRef idx="1">
+              <a:schemeClr val="accent1"/>
+            </a:fillRef>
+            <a:effectRef idx="0">
+              <a:schemeClr val="accent1"/>
+            </a:effectRef>
+            <a:fontRef idx="minor">
+              <a:schemeClr val="lt1"/>
+            </a:fontRef>
+          </p:style>
+          <p:txBody>
+            <a:bodyPr rtlCol="0" anchor="ctr"/>
+            <a:lstStyle/>
+            <a:p>
+              <a:pPr algn="ctr"/>
+              <a:endParaRPr lang="en-GB"/>
+            </a:p>
+          </p:txBody>
+        </p:sp>
+        <p:sp>
+          <p:nvSpPr>
+            <p:cNvPr id="46" name="Oval 45"/>
+            <p:cNvSpPr/>
+            <p:nvPr/>
+          </p:nvSpPr>
+          <p:spPr>
+            <a:xfrm>
+              <a:off x="6424897" y="5833699"/>
+              <a:ext cx="288000" cy="288000"/>
+            </a:xfrm>
+            <a:prstGeom prst="ellipse">
+              <a:avLst/>
+            </a:prstGeom>
+            <a:noFill/>
+            <a:ln/>
+          </p:spPr>
+          <p:style>
+            <a:lnRef idx="2">
+              <a:schemeClr val="dk1"/>
+            </a:lnRef>
+            <a:fillRef idx="1">
+              <a:schemeClr val="lt1"/>
+            </a:fillRef>
+            <a:effectRef idx="0">
+              <a:schemeClr val="dk1"/>
+            </a:effectRef>
+            <a:fontRef idx="minor">
+              <a:schemeClr val="dk1"/>
+            </a:fontRef>
+          </p:style>
+          <p:txBody>
+            <a:bodyPr rtlCol="0" anchor="ctr"/>
+            <a:lstStyle/>
+            <a:p>
+              <a:pPr algn="ctr"/>
+              <a:endParaRPr lang="en-GB"/>
+            </a:p>
+          </p:txBody>
+        </p:sp>
+      </p:grpSp>
+      <p:sp>
+        <p:nvSpPr>
+          <p:cNvPr id="53" name="TextBox 52"/>
+          <p:cNvSpPr txBox="1"/>
+          <p:nvPr/>
+        </p:nvSpPr>
+        <p:spPr>
+          <a:xfrm>
+            <a:off x="5388728" y="2320448"/>
+            <a:ext cx="526106" cy="276999"/>
+          </a:xfrm>
+          <a:prstGeom prst="rect">
+            <a:avLst/>
+          </a:prstGeom>
+          <a:noFill/>
+        </p:spPr>
+        <p:txBody>
+          <a:bodyPr wrap="none" rtlCol="0">
+            <a:spAutoFit/>
+          </a:bodyPr>
+          <a:lstStyle/>
+          <a:p>
+            <a:r>
+              <a:rPr lang="en-GB" sz="1200" smtClean="0"/>
+              <a:t>[Else]</a:t>
+            </a:r>
+            <a:endParaRPr lang="en-GB" sz="1200"/>
+          </a:p>
+        </p:txBody>
+      </p:sp>
+      <p:cxnSp>
+        <p:nvCxnSpPr>
+          <p:cNvPr id="33" name="Straight Arrow Connector 32"/>
+          <p:cNvCxnSpPr>
+            <a:stCxn id="16" idx="2"/>
+            <a:endCxn id="35" idx="0"/>
+          </p:cNvCxnSpPr>
+          <p:nvPr/>
+        </p:nvCxnSpPr>
+        <p:spPr>
+          <a:xfrm>
+            <a:off x="6568898" y="2146041"/>
+            <a:ext cx="0" cy="302429"/>
+          </a:xfrm>
+          <a:prstGeom prst="straightConnector1">
+            <a:avLst/>
+          </a:prstGeom>
+          <a:ln>
+            <a:tailEnd type="triangle" w="lg" len="lg"/>
+          </a:ln>
+        </p:spPr>
+        <p:style>
+          <a:lnRef idx="1">
+            <a:schemeClr val="dk1"/>
+          </a:lnRef>
+          <a:fillRef idx="0">
+            <a:schemeClr val="dk1"/>
+          </a:fillRef>
+          <a:effectRef idx="0">
+            <a:schemeClr val="dk1"/>
+          </a:effectRef>
+          <a:fontRef idx="minor">
+            <a:schemeClr val="tx1"/>
+          </a:fontRef>
+        </p:style>
+      </p:cxnSp>
+      <p:cxnSp>
+        <p:nvCxnSpPr>
+          <p:cNvPr id="37" name="Straight Arrow Connector 36"/>
+          <p:cNvCxnSpPr>
+            <a:stCxn id="35" idx="1"/>
+            <a:endCxn id="24" idx="3"/>
+          </p:cNvCxnSpPr>
+          <p:nvPr/>
+        </p:nvCxnSpPr>
+        <p:spPr>
+          <a:xfrm flipH="1" flipV="1">
+            <a:off x="4538687" y="2593766"/>
+            <a:ext cx="1756667" cy="3681"/>
+          </a:xfrm>
+          <a:prstGeom prst="straightConnector1">
+            <a:avLst/>
+          </a:prstGeom>
+          <a:ln>
+            <a:tailEnd type="triangle" w="lg" len="lg"/>
+          </a:ln>
+        </p:spPr>
+        <p:style>
+          <a:lnRef idx="1">
+            <a:schemeClr val="dk1"/>
+          </a:lnRef>
+          <a:fillRef idx="0">
+            <a:schemeClr val="dk1"/>
+          </a:fillRef>
+          <a:effectRef idx="0">
+            <a:schemeClr val="dk1"/>
+          </a:effectRef>
+          <a:fontRef idx="minor">
+            <a:schemeClr val="tx1"/>
+          </a:fontRef>
+        </p:style>
+      </p:cxnSp>
+      <p:cxnSp>
+        <p:nvCxnSpPr>
+          <p:cNvPr id="43" name="Straight Arrow Connector 42"/>
+          <p:cNvCxnSpPr>
+            <a:stCxn id="24" idx="1"/>
+            <a:endCxn id="46" idx="6"/>
+          </p:cNvCxnSpPr>
+          <p:nvPr/>
+        </p:nvCxnSpPr>
+        <p:spPr>
+          <a:xfrm flipH="1">
+            <a:off x="2776862" y="2593766"/>
+            <a:ext cx="215650" cy="0"/>
+          </a:xfrm>
+          <a:prstGeom prst="straightConnector1">
+            <a:avLst/>
+          </a:prstGeom>
+          <a:ln>
+            <a:tailEnd type="triangle" w="lg" len="lg"/>
+          </a:ln>
+        </p:spPr>
+        <p:style>
+          <a:lnRef idx="1">
+            <a:schemeClr val="dk1"/>
+          </a:lnRef>
+          <a:fillRef idx="0">
+            <a:schemeClr val="dk1"/>
+          </a:fillRef>
+          <a:effectRef idx="0">
+            <a:schemeClr val="dk1"/>
+          </a:effectRef>
+          <a:fontRef idx="minor">
+            <a:schemeClr val="tx1"/>
+          </a:fontRef>
+        </p:style>
+      </p:cxnSp>
+      <p:sp>
+        <p:nvSpPr>
+          <p:cNvPr id="44" name="TextBox 43"/>
+          <p:cNvSpPr txBox="1"/>
+          <p:nvPr/>
+        </p:nvSpPr>
+        <p:spPr>
+          <a:xfrm>
+            <a:off x="6527029" y="2776500"/>
+            <a:ext cx="989438" cy="276999"/>
+          </a:xfrm>
+          <a:prstGeom prst="rect">
+            <a:avLst/>
+          </a:prstGeom>
+          <a:noFill/>
+        </p:spPr>
+        <p:txBody>
+          <a:bodyPr wrap="none" rtlCol="0">
+            <a:spAutoFit/>
+          </a:bodyPr>
+          <a:lstStyle/>
+          <a:p>
+            <a:r>
+              <a:rPr lang="en-GB" sz="1200" dirty="0" smtClean="0"/>
+              <a:t>[Entry exists]</a:t>
+            </a:r>
+            <a:endParaRPr lang="en-GB" sz="1200" dirty="0"/>
+          </a:p>
+        </p:txBody>
+      </p:sp>
+      <p:sp>
+        <p:nvSpPr>
+          <p:cNvPr id="48" name="Rounded Rectangle 47"/>
           <p:cNvSpPr/>
           <p:nvPr/>
         </p:nvSpPr>
         <p:spPr>
           <a:xfrm>
-            <a:off x="5558506" y="5025389"/>
-            <a:ext cx="2020783" cy="466530"/>
+            <a:off x="2992512" y="3342649"/>
+            <a:ext cx="1546175" cy="466530"/>
           </a:xfrm>
           <a:prstGeom prst="roundRect">
             <a:avLst>
@@ -3665,7 +4354,7 @@
                   <a:sysClr val="windowText" lastClr="000000"/>
                 </a:solidFill>
               </a:rPr>
-              <a:t>Route to gift specific Read page, present html</a:t>
+              <a:t>Update stock</a:t>
             </a:r>
             <a:endParaRPr lang="en-GB" sz="1200" dirty="0">
               <a:solidFill>
@@ -3677,13 +4366,13 @@
       </p:sp>
       <p:sp>
         <p:nvSpPr>
-          <p:cNvPr id="34" name="Rounded Rectangle 33"/>
+          <p:cNvPr id="49" name="Rounded Rectangle 48"/>
           <p:cNvSpPr/>
           <p:nvPr/>
         </p:nvSpPr>
         <p:spPr>
           <a:xfrm>
-            <a:off x="5558505" y="2774894"/>
+            <a:off x="5558505" y="3342649"/>
             <a:ext cx="2020783" cy="466530"/>
           </a:xfrm>
           <a:prstGeom prst="roundRect">
@@ -3725,7 +4414,7 @@
                   <a:sysClr val="windowText" lastClr="000000"/>
                 </a:solidFill>
               </a:rPr>
-              <a:t>Verify input data types</a:t>
+              <a:t>Confirm detail validity</a:t>
             </a:r>
             <a:endParaRPr lang="en-GB" sz="1200" dirty="0">
               <a:solidFill>
@@ -3735,15 +4424,51 @@
           </a:p>
         </p:txBody>
       </p:sp>
-      <p:sp>
-        <p:nvSpPr>
-          <p:cNvPr id="35" name="Diamond 34"/>
+      <p:cxnSp>
+        <p:nvCxnSpPr>
+          <p:cNvPr id="51" name="Straight Arrow Connector 50"/>
+          <p:cNvCxnSpPr>
+            <a:stCxn id="48" idx="3"/>
+            <a:endCxn id="49" idx="1"/>
+          </p:cNvCxnSpPr>
+          <p:nvPr/>
+        </p:nvCxnSpPr>
+        <p:spPr>
+          <a:xfrm>
+            <a:off x="4538687" y="3575914"/>
+            <a:ext cx="1019818" cy="0"/>
+          </a:xfrm>
+          <a:prstGeom prst="straightConnector1">
+            <a:avLst/>
+          </a:prstGeom>
+          <a:ln>
+            <a:tailEnd type="triangle" w="lg" len="lg"/>
+          </a:ln>
+        </p:spPr>
+        <p:style>
+          <a:lnRef idx="1">
+            <a:schemeClr val="dk1"/>
+          </a:lnRef>
+          <a:fillRef idx="0">
+            <a:schemeClr val="dk1"/>
+          </a:fillRef>
+          <a:effectRef idx="0">
+            <a:schemeClr val="dk1"/>
+          </a:effectRef>
+          <a:fontRef idx="minor">
+            <a:schemeClr val="tx1"/>
+          </a:fontRef>
+        </p:style>
+      </p:cxnSp>
+      <p:sp>
+        <p:nvSpPr>
+          <p:cNvPr id="52" name="Diamond 51"/>
           <p:cNvSpPr/>
           <p:nvPr/>
         </p:nvSpPr>
         <p:spPr>
           <a:xfrm>
-            <a:off x="6295354" y="3579727"/>
+            <a:off x="6295354" y="4181594"/>
             <a:ext cx="547087" cy="297954"/>
           </a:xfrm>
           <a:prstGeom prst="diamond">
@@ -3783,19 +4508,19 @@
       </p:sp>
       <p:cxnSp>
         <p:nvCxnSpPr>
-          <p:cNvPr id="36" name="Elbow Connector 35"/>
+          <p:cNvPr id="56" name="Straight Arrow Connector 55"/>
           <p:cNvCxnSpPr>
-            <a:stCxn id="35" idx="1"/>
-            <a:endCxn id="24" idx="2"/>
+            <a:stCxn id="49" idx="2"/>
+            <a:endCxn id="52" idx="0"/>
           </p:cNvCxnSpPr>
           <p:nvPr/>
         </p:nvCxnSpPr>
         <p:spPr>
-          <a:xfrm rot="10800000">
-            <a:off x="3768548" y="3238352"/>
-            <a:ext cx="2526806" cy="490353"/>
-          </a:xfrm>
-          <a:prstGeom prst="bentConnector2">
+          <a:xfrm>
+            <a:off x="6568897" y="3809179"/>
+            <a:ext cx="1" cy="372415"/>
+          </a:xfrm>
+          <a:prstGeom prst="straightConnector1">
             <a:avLst/>
           </a:prstGeom>
           <a:ln>
@@ -3819,19 +4544,19 @@
       </p:cxnSp>
       <p:cxnSp>
         <p:nvCxnSpPr>
-          <p:cNvPr id="39" name="Straight Arrow Connector 38"/>
+          <p:cNvPr id="57" name="Elbow Connector 56"/>
           <p:cNvCxnSpPr>
-            <a:stCxn id="34" idx="2"/>
-            <a:endCxn id="35" idx="0"/>
+            <a:stCxn id="52" idx="1"/>
+            <a:endCxn id="48" idx="2"/>
           </p:cNvCxnSpPr>
           <p:nvPr/>
         </p:nvCxnSpPr>
         <p:spPr>
-          <a:xfrm>
-            <a:off x="6568897" y="3241424"/>
-            <a:ext cx="1" cy="338303"/>
-          </a:xfrm>
-          <a:prstGeom prst="straightConnector1">
+          <a:xfrm rot="10800000">
+            <a:off x="3765600" y="3809179"/>
+            <a:ext cx="2529754" cy="521392"/>
+          </a:xfrm>
+          <a:prstGeom prst="bentConnector2">
             <a:avLst/>
           </a:prstGeom>
           <a:ln>
@@ -3855,17 +4580,17 @@
       </p:cxnSp>
       <p:cxnSp>
         <p:nvCxnSpPr>
-          <p:cNvPr id="42" name="Straight Arrow Connector 41"/>
+          <p:cNvPr id="59" name="Straight Arrow Connector 58"/>
           <p:cNvCxnSpPr>
-            <a:stCxn id="35" idx="2"/>
-            <a:endCxn id="31" idx="0"/>
+            <a:stCxn id="52" idx="2"/>
+            <a:endCxn id="66" idx="0"/>
           </p:cNvCxnSpPr>
           <p:nvPr/>
         </p:nvCxnSpPr>
         <p:spPr>
-          <a:xfrm>
-            <a:off x="6568898" y="3877681"/>
-            <a:ext cx="0" cy="368378"/>
+          <a:xfrm flipH="1">
+            <a:off x="6568896" y="4479548"/>
+            <a:ext cx="2" cy="424393"/>
           </a:xfrm>
           <a:prstGeom prst="straightConnector1">
             <a:avLst/>
@@ -3891,21 +4616,214 @@
       </p:cxnSp>
       <p:sp>
         <p:nvSpPr>
-          <p:cNvPr id="45" name="Oval 44"/>
+          <p:cNvPr id="62" name="TextBox 61"/>
+          <p:cNvSpPr txBox="1"/>
+          <p:nvPr/>
+        </p:nvSpPr>
+        <p:spPr>
+          <a:xfrm>
+            <a:off x="6569614" y="4538334"/>
+            <a:ext cx="1040798" cy="276999"/>
+          </a:xfrm>
+          <a:prstGeom prst="rect">
+            <a:avLst/>
+          </a:prstGeom>
+          <a:noFill/>
+        </p:spPr>
+        <p:txBody>
+          <a:bodyPr wrap="none" rtlCol="0">
+            <a:spAutoFit/>
+          </a:bodyPr>
+          <a:lstStyle/>
+          <a:p>
+            <a:r>
+              <a:rPr lang="en-GB" sz="1200" dirty="0" smtClean="0"/>
+              <a:t>[Details Valid]</a:t>
+            </a:r>
+            <a:endParaRPr lang="en-GB" sz="1200" dirty="0"/>
+          </a:p>
+        </p:txBody>
+      </p:sp>
+      <p:sp>
+        <p:nvSpPr>
+          <p:cNvPr id="63" name="TextBox 62"/>
+          <p:cNvSpPr txBox="1"/>
+          <p:nvPr/>
+        </p:nvSpPr>
+        <p:spPr>
+          <a:xfrm>
+            <a:off x="5701760" y="4069875"/>
+            <a:ext cx="526106" cy="276999"/>
+          </a:xfrm>
+          <a:prstGeom prst="rect">
+            <a:avLst/>
+          </a:prstGeom>
+          <a:noFill/>
+        </p:spPr>
+        <p:txBody>
+          <a:bodyPr wrap="none" rtlCol="0">
+            <a:spAutoFit/>
+          </a:bodyPr>
+          <a:lstStyle/>
+          <a:p>
+            <a:r>
+              <a:rPr lang="en-GB" sz="1200" smtClean="0"/>
+              <a:t>[Else]</a:t>
+            </a:r>
+            <a:endParaRPr lang="en-GB" sz="1200"/>
+          </a:p>
+        </p:txBody>
+      </p:sp>
+      <p:grpSp>
+        <p:nvGrpSpPr>
+          <p:cNvPr id="64" name="Group 63"/>
+          <p:cNvGrpSpPr/>
+          <p:nvPr/>
+        </p:nvGrpSpPr>
+        <p:grpSpPr>
+          <a:xfrm>
+            <a:off x="6465709" y="4903941"/>
+            <a:ext cx="206374" cy="206374"/>
+            <a:chOff x="6424897" y="5833699"/>
+            <a:chExt cx="288000" cy="288000"/>
+          </a:xfrm>
+        </p:grpSpPr>
+        <p:sp>
+          <p:nvSpPr>
+            <p:cNvPr id="65" name="Oval 64"/>
+            <p:cNvSpPr/>
+            <p:nvPr/>
+          </p:nvSpPr>
+          <p:spPr>
+            <a:xfrm>
+              <a:off x="6460897" y="5869699"/>
+              <a:ext cx="216000" cy="216000"/>
+            </a:xfrm>
+            <a:prstGeom prst="ellipse">
+              <a:avLst/>
+            </a:prstGeom>
+            <a:solidFill>
+              <a:schemeClr val="tx1"/>
+            </a:solidFill>
+            <a:ln>
+              <a:solidFill>
+                <a:schemeClr val="tx1"/>
+              </a:solidFill>
+            </a:ln>
+          </p:spPr>
+          <p:style>
+            <a:lnRef idx="2">
+              <a:schemeClr val="accent1">
+                <a:shade val="50000"/>
+              </a:schemeClr>
+            </a:lnRef>
+            <a:fillRef idx="1">
+              <a:schemeClr val="accent1"/>
+            </a:fillRef>
+            <a:effectRef idx="0">
+              <a:schemeClr val="accent1"/>
+            </a:effectRef>
+            <a:fontRef idx="minor">
+              <a:schemeClr val="lt1"/>
+            </a:fontRef>
+          </p:style>
+          <p:txBody>
+            <a:bodyPr rtlCol="0" anchor="ctr"/>
+            <a:lstStyle/>
+            <a:p>
+              <a:pPr algn="ctr"/>
+              <a:endParaRPr lang="en-GB"/>
+            </a:p>
+          </p:txBody>
+        </p:sp>
+        <p:sp>
+          <p:nvSpPr>
+            <p:cNvPr id="66" name="Oval 65"/>
+            <p:cNvSpPr/>
+            <p:nvPr/>
+          </p:nvSpPr>
+          <p:spPr>
+            <a:xfrm>
+              <a:off x="6424897" y="5833699"/>
+              <a:ext cx="288000" cy="288000"/>
+            </a:xfrm>
+            <a:prstGeom prst="ellipse">
+              <a:avLst/>
+            </a:prstGeom>
+            <a:noFill/>
+            <a:ln/>
+          </p:spPr>
+          <p:style>
+            <a:lnRef idx="2">
+              <a:schemeClr val="dk1"/>
+            </a:lnRef>
+            <a:fillRef idx="1">
+              <a:schemeClr val="lt1"/>
+            </a:fillRef>
+            <a:effectRef idx="0">
+              <a:schemeClr val="dk1"/>
+            </a:effectRef>
+            <a:fontRef idx="minor">
+              <a:schemeClr val="dk1"/>
+            </a:fontRef>
+          </p:style>
+          <p:txBody>
+            <a:bodyPr rtlCol="0" anchor="ctr"/>
+            <a:lstStyle/>
+            <a:p>
+              <a:pPr algn="ctr"/>
+              <a:endParaRPr lang="en-GB"/>
+            </a:p>
+          </p:txBody>
+        </p:sp>
+      </p:grpSp>
+    </p:spTree>
+    <p:extLst>
+      <p:ext uri="{BB962C8B-B14F-4D97-AF65-F5344CB8AC3E}">
+        <p14:creationId xmlns:p14="http://schemas.microsoft.com/office/powerpoint/2010/main" val="53989423"/>
+      </p:ext>
+    </p:extLst>
+  </p:cSld>
+  <p:clrMapOvr>
+    <a:masterClrMapping/>
+  </p:clrMapOvr>
+</p:sld>
+</file>
+
+<file path=ppt/slides/slide2.xml><?xml version="1.0" encoding="utf-8"?>
+<p:sld xmlns:a="http://schemas.openxmlformats.org/drawingml/2006/main" xmlns:r="http://schemas.openxmlformats.org/officeDocument/2006/relationships" xmlns:p="http://schemas.openxmlformats.org/presentationml/2006/main">
+  <p:cSld>
+    <p:spTree>
+      <p:nvGrpSpPr>
+        <p:cNvPr id="1" name=""/>
+        <p:cNvGrpSpPr/>
+        <p:nvPr/>
+      </p:nvGrpSpPr>
+      <p:grpSpPr>
+        <a:xfrm>
+          <a:off x="0" y="0"/>
+          <a:ext cx="0" cy="0"/>
+          <a:chOff x="0" y="0"/>
+          <a:chExt cx="0" cy="0"/>
+        </a:xfrm>
+      </p:grpSpPr>
+      <p:sp>
+        <p:nvSpPr>
+          <p:cNvPr id="5" name="Rounded Rectangle 4"/>
           <p:cNvSpPr/>
           <p:nvPr/>
         </p:nvSpPr>
         <p:spPr>
           <a:xfrm>
-            <a:off x="6460897" y="5869699"/>
-            <a:ext cx="216000" cy="216000"/>
-          </a:xfrm>
-          <a:prstGeom prst="ellipse">
-            <a:avLst/>
-          </a:prstGeom>
-          <a:solidFill>
-            <a:schemeClr val="tx1"/>
-          </a:solidFill>
+            <a:off x="3042605" y="1679511"/>
+            <a:ext cx="1447364" cy="466530"/>
+          </a:xfrm>
+          <a:prstGeom prst="roundRect">
+            <a:avLst>
+              <a:gd name="adj" fmla="val 23513"/>
+            </a:avLst>
+          </a:prstGeom>
+          <a:noFill/>
           <a:ln>
             <a:solidFill>
               <a:schemeClr val="tx1"/>
@@ -3933,39 +4851,59 @@
           <a:lstStyle/>
           <a:p>
             <a:pPr algn="ctr"/>
-            <a:endParaRPr lang="en-GB"/>
-          </a:p>
-        </p:txBody>
-      </p:sp>
-      <p:sp>
-        <p:nvSpPr>
-          <p:cNvPr id="46" name="Oval 45"/>
+            <a:r>
+              <a:rPr lang="en-GB" dirty="0" smtClean="0">
+                <a:solidFill>
+                  <a:sysClr val="windowText" lastClr="000000"/>
+                </a:solidFill>
+              </a:rPr>
+              <a:t>Customer</a:t>
+            </a:r>
+            <a:endParaRPr lang="en-GB" dirty="0">
+              <a:solidFill>
+                <a:sysClr val="windowText" lastClr="000000"/>
+              </a:solidFill>
+            </a:endParaRPr>
+          </a:p>
+        </p:txBody>
+      </p:sp>
+      <p:sp>
+        <p:nvSpPr>
+          <p:cNvPr id="8" name="Rounded Rectangle 7"/>
           <p:cNvSpPr/>
           <p:nvPr/>
         </p:nvSpPr>
         <p:spPr>
           <a:xfrm>
-            <a:off x="6424897" y="5833699"/>
-            <a:ext cx="288000" cy="288000"/>
-          </a:xfrm>
-          <a:prstGeom prst="ellipse">
-            <a:avLst/>
+            <a:off x="5394507" y="1679511"/>
+            <a:ext cx="1447364" cy="466530"/>
+          </a:xfrm>
+          <a:prstGeom prst="roundRect">
+            <a:avLst>
+              <a:gd name="adj" fmla="val 23513"/>
+            </a:avLst>
           </a:prstGeom>
           <a:noFill/>
-          <a:ln/>
+          <a:ln>
+            <a:solidFill>
+              <a:schemeClr val="tx1"/>
+            </a:solidFill>
+          </a:ln>
         </p:spPr>
         <p:style>
           <a:lnRef idx="2">
-            <a:schemeClr val="dk1"/>
+            <a:schemeClr val="accent1">
+              <a:shade val="50000"/>
+            </a:schemeClr>
           </a:lnRef>
           <a:fillRef idx="1">
-            <a:schemeClr val="lt1"/>
+            <a:schemeClr val="accent1"/>
           </a:fillRef>
           <a:effectRef idx="0">
-            <a:schemeClr val="dk1"/>
+            <a:schemeClr val="accent1"/>
           </a:effectRef>
           <a:fontRef idx="minor">
-            <a:schemeClr val="dk1"/>
+            <a:schemeClr val="lt1"/>
           </a:fontRef>
         </p:style>
         <p:txBody>
@@ -3973,29 +4911,40 @@
           <a:lstStyle/>
           <a:p>
             <a:pPr algn="ctr"/>
-            <a:endParaRPr lang="en-GB"/>
+            <a:r>
+              <a:rPr lang="en-GB" smtClean="0">
+                <a:solidFill>
+                  <a:sysClr val="windowText" lastClr="000000"/>
+                </a:solidFill>
+              </a:rPr>
+              <a:t>Pub</a:t>
+            </a:r>
+            <a:endParaRPr lang="en-GB" dirty="0">
+              <a:solidFill>
+                <a:sysClr val="windowText" lastClr="000000"/>
+              </a:solidFill>
+            </a:endParaRPr>
           </a:p>
         </p:txBody>
       </p:sp>
       <p:cxnSp>
         <p:nvCxnSpPr>
-          <p:cNvPr id="47" name="Straight Arrow Connector 46"/>
+          <p:cNvPr id="10" name="Straight Connector 9"/>
           <p:cNvCxnSpPr>
-            <a:stCxn id="31" idx="2"/>
-            <a:endCxn id="32" idx="0"/>
+            <a:stCxn id="5" idx="2"/>
           </p:cNvCxnSpPr>
           <p:nvPr/>
         </p:nvCxnSpPr>
         <p:spPr>
-          <a:xfrm>
-            <a:off x="6568898" y="4712589"/>
-            <a:ext cx="0" cy="312800"/>
-          </a:xfrm>
-          <a:prstGeom prst="straightConnector1">
+          <a:xfrm flipH="1">
+            <a:off x="3766286" y="2146041"/>
+            <a:ext cx="1" cy="3586165"/>
+          </a:xfrm>
+          <a:prstGeom prst="line">
             <a:avLst/>
           </a:prstGeom>
           <a:ln>
-            <a:tailEnd type="triangle" w="lg" len="lg"/>
+            <a:prstDash val="lgDash"/>
           </a:ln>
         </p:spPr>
         <p:style>
@@ -4015,23 +4964,22 @@
       </p:cxnSp>
       <p:cxnSp>
         <p:nvCxnSpPr>
-          <p:cNvPr id="50" name="Straight Arrow Connector 49"/>
+          <p:cNvPr id="11" name="Straight Connector 10"/>
           <p:cNvCxnSpPr>
-            <a:stCxn id="32" idx="2"/>
-            <a:endCxn id="46" idx="0"/>
+            <a:stCxn id="8" idx="2"/>
           </p:cNvCxnSpPr>
           <p:nvPr/>
         </p:nvCxnSpPr>
         <p:spPr>
           <a:xfrm flipH="1">
-            <a:off x="6568897" y="5491919"/>
-            <a:ext cx="1" cy="341780"/>
-          </a:xfrm>
-          <a:prstGeom prst="straightConnector1">
+            <a:off x="6118188" y="2146041"/>
+            <a:ext cx="1" cy="3586165"/>
+          </a:xfrm>
+          <a:prstGeom prst="line">
             <a:avLst/>
           </a:prstGeom>
           <a:ln>
-            <a:tailEnd type="triangle" w="lg" len="lg"/>
+            <a:prstDash val="lgDash"/>
           </a:ln>
         </p:spPr>
         <p:style>
@@ -4051,87 +4999,75 @@
       </p:cxnSp>
       <p:sp>
         <p:nvSpPr>
-          <p:cNvPr id="53" name="TextBox 52"/>
-          <p:cNvSpPr txBox="1"/>
-          <p:nvPr/>
-        </p:nvSpPr>
-        <p:spPr>
-          <a:xfrm>
-            <a:off x="5558505" y="3451705"/>
-            <a:ext cx="526106" cy="276999"/>
-          </a:xfrm>
-          <a:prstGeom prst="rect">
-            <a:avLst/>
-          </a:prstGeom>
-          <a:noFill/>
-        </p:spPr>
-        <p:txBody>
-          <a:bodyPr wrap="none" rtlCol="0">
-            <a:spAutoFit/>
-          </a:bodyPr>
-          <a:lstStyle/>
-          <a:p>
-            <a:r>
-              <a:rPr lang="en-GB" sz="1200" smtClean="0"/>
-              <a:t>[Else]</a:t>
-            </a:r>
-            <a:endParaRPr lang="en-GB" sz="1200"/>
-          </a:p>
-        </p:txBody>
-      </p:sp>
-      <p:sp>
-        <p:nvSpPr>
-          <p:cNvPr id="54" name="TextBox 53"/>
-          <p:cNvSpPr txBox="1"/>
-          <p:nvPr/>
-        </p:nvSpPr>
-        <p:spPr>
-          <a:xfrm>
-            <a:off x="6673254" y="3766394"/>
-            <a:ext cx="1307686" cy="461665"/>
-          </a:xfrm>
-          <a:prstGeom prst="rect">
-            <a:avLst/>
-          </a:prstGeom>
-          <a:noFill/>
-        </p:spPr>
-        <p:txBody>
-          <a:bodyPr wrap="square" rtlCol="0">
-            <a:spAutoFit/>
-          </a:bodyPr>
-          <a:lstStyle/>
-          <a:p>
-            <a:r>
-              <a:rPr lang="en-GB" sz="1200" dirty="0" smtClean="0"/>
-              <a:t>[Data </a:t>
-            </a:r>
-            <a:r>
-              <a:rPr lang="en-GB" sz="1200" smtClean="0"/>
-              <a:t>types appropriate]</a:t>
-            </a:r>
-            <a:endParaRPr lang="en-GB" sz="1200" dirty="0"/>
+          <p:cNvPr id="14" name="Rounded Rectangle 13"/>
+          <p:cNvSpPr/>
+          <p:nvPr/>
+        </p:nvSpPr>
+        <p:spPr>
+          <a:xfrm>
+            <a:off x="5926709" y="2733366"/>
+            <a:ext cx="382959" cy="2609343"/>
+          </a:xfrm>
+          <a:prstGeom prst="roundRect">
+            <a:avLst>
+              <a:gd name="adj" fmla="val 0"/>
+            </a:avLst>
+          </a:prstGeom>
+          <a:solidFill>
+            <a:schemeClr val="bg1"/>
+          </a:solidFill>
+          <a:ln>
+            <a:solidFill>
+              <a:schemeClr val="tx1"/>
+            </a:solidFill>
+          </a:ln>
+        </p:spPr>
+        <p:style>
+          <a:lnRef idx="2">
+            <a:schemeClr val="accent1">
+              <a:shade val="50000"/>
+            </a:schemeClr>
+          </a:lnRef>
+          <a:fillRef idx="1">
+            <a:schemeClr val="accent1"/>
+          </a:fillRef>
+          <a:effectRef idx="0">
+            <a:schemeClr val="accent1"/>
+          </a:effectRef>
+          <a:fontRef idx="minor">
+            <a:schemeClr val="lt1"/>
+          </a:fontRef>
+        </p:style>
+        <p:txBody>
+          <a:bodyPr rtlCol="0" anchor="ctr"/>
+          <a:lstStyle/>
+          <a:p>
+            <a:pPr algn="ctr"/>
+            <a:endParaRPr lang="en-GB" dirty="0">
+              <a:solidFill>
+                <a:sysClr val="windowText" lastClr="000000"/>
+              </a:solidFill>
+            </a:endParaRPr>
           </a:p>
         </p:txBody>
       </p:sp>
       <p:cxnSp>
         <p:nvCxnSpPr>
-          <p:cNvPr id="55" name="Straight Arrow Connector 54"/>
-          <p:cNvCxnSpPr>
-            <a:stCxn id="24" idx="3"/>
-            <a:endCxn id="34" idx="1"/>
-          </p:cNvCxnSpPr>
+          <p:cNvPr id="16" name="Straight Arrow Connector 15"/>
+          <p:cNvCxnSpPr/>
           <p:nvPr/>
         </p:nvCxnSpPr>
         <p:spPr>
-          <a:xfrm>
-            <a:off x="4541635" y="3005086"/>
-            <a:ext cx="1016870" cy="3073"/>
+          <a:xfrm flipH="1">
+            <a:off x="3766288" y="2733366"/>
+            <a:ext cx="2160421" cy="0"/>
           </a:xfrm>
           <a:prstGeom prst="straightConnector1">
             <a:avLst/>
           </a:prstGeom>
           <a:ln>
-            <a:tailEnd type="triangle" w="lg" len="lg"/>
+            <a:headEnd type="stealth" w="lg" len="lg"/>
+            <a:tailEnd type="none" w="lg" len="lg"/>
           </a:ln>
         </p:spPr>
         <p:style>
@@ -4149,10 +5085,1361 @@
           </a:fontRef>
         </p:style>
       </p:cxnSp>
+      <p:sp>
+        <p:nvSpPr>
+          <p:cNvPr id="18" name="Rounded Rectangle 17"/>
+          <p:cNvSpPr/>
+          <p:nvPr/>
+        </p:nvSpPr>
+        <p:spPr>
+          <a:xfrm>
+            <a:off x="6118189" y="4326506"/>
+            <a:ext cx="382959" cy="728820"/>
+          </a:xfrm>
+          <a:prstGeom prst="roundRect">
+            <a:avLst>
+              <a:gd name="adj" fmla="val 0"/>
+            </a:avLst>
+          </a:prstGeom>
+          <a:solidFill>
+            <a:schemeClr val="bg1"/>
+          </a:solidFill>
+          <a:ln>
+            <a:solidFill>
+              <a:schemeClr val="tx1"/>
+            </a:solidFill>
+          </a:ln>
+        </p:spPr>
+        <p:style>
+          <a:lnRef idx="2">
+            <a:schemeClr val="accent1">
+              <a:shade val="50000"/>
+            </a:schemeClr>
+          </a:lnRef>
+          <a:fillRef idx="1">
+            <a:schemeClr val="accent1"/>
+          </a:fillRef>
+          <a:effectRef idx="0">
+            <a:schemeClr val="accent1"/>
+          </a:effectRef>
+          <a:fontRef idx="minor">
+            <a:schemeClr val="lt1"/>
+          </a:fontRef>
+        </p:style>
+        <p:txBody>
+          <a:bodyPr rtlCol="0" anchor="ctr"/>
+          <a:lstStyle/>
+          <a:p>
+            <a:pPr algn="ctr"/>
+            <a:endParaRPr lang="en-GB" dirty="0">
+              <a:solidFill>
+                <a:sysClr val="windowText" lastClr="000000"/>
+              </a:solidFill>
+            </a:endParaRPr>
+          </a:p>
+        </p:txBody>
+      </p:sp>
+      <p:cxnSp>
+        <p:nvCxnSpPr>
+          <p:cNvPr id="42" name="Straight Connector 41"/>
+          <p:cNvCxnSpPr/>
+          <p:nvPr/>
+        </p:nvCxnSpPr>
+        <p:spPr>
+          <a:xfrm>
+            <a:off x="6319665" y="4023209"/>
+            <a:ext cx="806523" cy="0"/>
+          </a:xfrm>
+          <a:prstGeom prst="line">
+            <a:avLst/>
+          </a:prstGeom>
+        </p:spPr>
+        <p:style>
+          <a:lnRef idx="1">
+            <a:schemeClr val="dk1"/>
+          </a:lnRef>
+          <a:fillRef idx="0">
+            <a:schemeClr val="dk1"/>
+          </a:fillRef>
+          <a:effectRef idx="0">
+            <a:schemeClr val="dk1"/>
+          </a:effectRef>
+          <a:fontRef idx="minor">
+            <a:schemeClr val="tx1"/>
+          </a:fontRef>
+        </p:style>
+      </p:cxnSp>
+      <p:cxnSp>
+        <p:nvCxnSpPr>
+          <p:cNvPr id="43" name="Straight Connector 42"/>
+          <p:cNvCxnSpPr/>
+          <p:nvPr/>
+        </p:nvCxnSpPr>
+        <p:spPr>
+          <a:xfrm>
+            <a:off x="7116191" y="4038037"/>
+            <a:ext cx="0" cy="288469"/>
+          </a:xfrm>
+          <a:prstGeom prst="line">
+            <a:avLst/>
+          </a:prstGeom>
+        </p:spPr>
+        <p:style>
+          <a:lnRef idx="1">
+            <a:schemeClr val="dk1"/>
+          </a:lnRef>
+          <a:fillRef idx="0">
+            <a:schemeClr val="dk1"/>
+          </a:fillRef>
+          <a:effectRef idx="0">
+            <a:schemeClr val="dk1"/>
+          </a:effectRef>
+          <a:fontRef idx="minor">
+            <a:schemeClr val="tx1"/>
+          </a:fontRef>
+        </p:style>
+      </p:cxnSp>
+      <p:cxnSp>
+        <p:nvCxnSpPr>
+          <p:cNvPr id="47" name="Straight Arrow Connector 46"/>
+          <p:cNvCxnSpPr/>
+          <p:nvPr/>
+        </p:nvCxnSpPr>
+        <p:spPr>
+          <a:xfrm>
+            <a:off x="6501148" y="4326506"/>
+            <a:ext cx="615043" cy="0"/>
+          </a:xfrm>
+          <a:prstGeom prst="straightConnector1">
+            <a:avLst/>
+          </a:prstGeom>
+          <a:ln>
+            <a:headEnd type="stealth" w="lg" len="lg"/>
+            <a:tailEnd type="none" w="lg" len="lg"/>
+          </a:ln>
+        </p:spPr>
+        <p:style>
+          <a:lnRef idx="1">
+            <a:schemeClr val="dk1"/>
+          </a:lnRef>
+          <a:fillRef idx="0">
+            <a:schemeClr val="dk1"/>
+          </a:fillRef>
+          <a:effectRef idx="0">
+            <a:schemeClr val="dk1"/>
+          </a:effectRef>
+          <a:fontRef idx="minor">
+            <a:schemeClr val="tx1"/>
+          </a:fontRef>
+        </p:style>
+      </p:cxnSp>
+      <p:sp>
+        <p:nvSpPr>
+          <p:cNvPr id="54" name="Rounded Rectangle 53"/>
+          <p:cNvSpPr/>
+          <p:nvPr/>
+        </p:nvSpPr>
+        <p:spPr>
+          <a:xfrm>
+            <a:off x="3574807" y="3199897"/>
+            <a:ext cx="382959" cy="575269"/>
+          </a:xfrm>
+          <a:prstGeom prst="roundRect">
+            <a:avLst>
+              <a:gd name="adj" fmla="val 0"/>
+            </a:avLst>
+          </a:prstGeom>
+          <a:solidFill>
+            <a:schemeClr val="bg1"/>
+          </a:solidFill>
+          <a:ln>
+            <a:solidFill>
+              <a:schemeClr val="tx1"/>
+            </a:solidFill>
+          </a:ln>
+        </p:spPr>
+        <p:style>
+          <a:lnRef idx="2">
+            <a:schemeClr val="accent1">
+              <a:shade val="50000"/>
+            </a:schemeClr>
+          </a:lnRef>
+          <a:fillRef idx="1">
+            <a:schemeClr val="accent1"/>
+          </a:fillRef>
+          <a:effectRef idx="0">
+            <a:schemeClr val="accent1"/>
+          </a:effectRef>
+          <a:fontRef idx="minor">
+            <a:schemeClr val="lt1"/>
+          </a:fontRef>
+        </p:style>
+        <p:txBody>
+          <a:bodyPr rtlCol="0" anchor="ctr"/>
+          <a:lstStyle/>
+          <a:p>
+            <a:pPr algn="ctr"/>
+            <a:endParaRPr lang="en-GB" dirty="0">
+              <a:solidFill>
+                <a:sysClr val="windowText" lastClr="000000"/>
+              </a:solidFill>
+            </a:endParaRPr>
+          </a:p>
+        </p:txBody>
+      </p:sp>
+      <p:cxnSp>
+        <p:nvCxnSpPr>
+          <p:cNvPr id="55" name="Straight Arrow Connector 54"/>
+          <p:cNvCxnSpPr/>
+          <p:nvPr/>
+        </p:nvCxnSpPr>
+        <p:spPr>
+          <a:xfrm flipV="1">
+            <a:off x="3957767" y="3199897"/>
+            <a:ext cx="1968942" cy="1"/>
+          </a:xfrm>
+          <a:prstGeom prst="straightConnector1">
+            <a:avLst/>
+          </a:prstGeom>
+          <a:ln>
+            <a:headEnd type="stealth" w="lg" len="lg"/>
+            <a:tailEnd type="none" w="lg" len="lg"/>
+          </a:ln>
+        </p:spPr>
+        <p:style>
+          <a:lnRef idx="1">
+            <a:schemeClr val="dk1"/>
+          </a:lnRef>
+          <a:fillRef idx="0">
+            <a:schemeClr val="dk1"/>
+          </a:fillRef>
+          <a:effectRef idx="0">
+            <a:schemeClr val="dk1"/>
+          </a:effectRef>
+          <a:fontRef idx="minor">
+            <a:schemeClr val="tx1"/>
+          </a:fontRef>
+        </p:style>
+      </p:cxnSp>
+      <p:sp>
+        <p:nvSpPr>
+          <p:cNvPr id="58" name="TextBox 57"/>
+          <p:cNvSpPr txBox="1"/>
+          <p:nvPr/>
+        </p:nvSpPr>
+        <p:spPr>
+          <a:xfrm>
+            <a:off x="3834595" y="2444567"/>
+            <a:ext cx="2215286" cy="307777"/>
+          </a:xfrm>
+          <a:prstGeom prst="rect">
+            <a:avLst/>
+          </a:prstGeom>
+          <a:noFill/>
+        </p:spPr>
+        <p:txBody>
+          <a:bodyPr wrap="none" rtlCol="0">
+            <a:spAutoFit/>
+          </a:bodyPr>
+          <a:lstStyle/>
+          <a:p>
+            <a:r>
+              <a:rPr lang="en-GB" sz="1400" dirty="0" smtClean="0"/>
+              <a:t>sellDrink(drinkId, customer)</a:t>
+            </a:r>
+            <a:endParaRPr lang="en-GB" sz="1400" dirty="0"/>
+          </a:p>
+        </p:txBody>
+      </p:sp>
+      <p:sp>
+        <p:nvSpPr>
+          <p:cNvPr id="59" name="TextBox 58"/>
+          <p:cNvSpPr txBox="1"/>
+          <p:nvPr/>
+        </p:nvSpPr>
+        <p:spPr>
+          <a:xfrm>
+            <a:off x="4122685" y="3199895"/>
+            <a:ext cx="1639103" cy="307777"/>
+          </a:xfrm>
+          <a:prstGeom prst="rect">
+            <a:avLst/>
+          </a:prstGeom>
+          <a:noFill/>
+        </p:spPr>
+        <p:txBody>
+          <a:bodyPr wrap="none" rtlCol="0">
+            <a:spAutoFit/>
+          </a:bodyPr>
+          <a:lstStyle/>
+          <a:p>
+            <a:r>
+              <a:rPr lang="en-GB" sz="1400" dirty="0" smtClean="0"/>
+              <a:t>payMoney(amount)</a:t>
+            </a:r>
+            <a:endParaRPr lang="en-GB" sz="1400" dirty="0"/>
+          </a:p>
+        </p:txBody>
+      </p:sp>
+      <p:cxnSp>
+        <p:nvCxnSpPr>
+          <p:cNvPr id="60" name="Straight Arrow Connector 59"/>
+          <p:cNvCxnSpPr/>
+          <p:nvPr/>
+        </p:nvCxnSpPr>
+        <p:spPr>
+          <a:xfrm flipH="1">
+            <a:off x="3957766" y="3769138"/>
+            <a:ext cx="1968942" cy="6029"/>
+          </a:xfrm>
+          <a:prstGeom prst="straightConnector1">
+            <a:avLst/>
+          </a:prstGeom>
+          <a:ln>
+            <a:headEnd type="stealth" w="lg" len="lg"/>
+            <a:tailEnd type="none" w="lg" len="lg"/>
+          </a:ln>
+        </p:spPr>
+        <p:style>
+          <a:lnRef idx="1">
+            <a:schemeClr val="dk1"/>
+          </a:lnRef>
+          <a:fillRef idx="0">
+            <a:schemeClr val="dk1"/>
+          </a:fillRef>
+          <a:effectRef idx="0">
+            <a:schemeClr val="dk1"/>
+          </a:effectRef>
+          <a:fontRef idx="minor">
+            <a:schemeClr val="tx1"/>
+          </a:fontRef>
+        </p:style>
+      </p:cxnSp>
+      <p:sp>
+        <p:nvSpPr>
+          <p:cNvPr id="64" name="TextBox 63"/>
+          <p:cNvSpPr txBox="1"/>
+          <p:nvPr/>
+        </p:nvSpPr>
+        <p:spPr>
+          <a:xfrm>
+            <a:off x="4489969" y="3769138"/>
+            <a:ext cx="756938" cy="307777"/>
+          </a:xfrm>
+          <a:prstGeom prst="rect">
+            <a:avLst/>
+          </a:prstGeom>
+          <a:noFill/>
+        </p:spPr>
+        <p:txBody>
+          <a:bodyPr wrap="none" rtlCol="0">
+            <a:spAutoFit/>
+          </a:bodyPr>
+          <a:lstStyle/>
+          <a:p>
+            <a:r>
+              <a:rPr lang="en-GB" sz="1400" smtClean="0"/>
+              <a:t>amount</a:t>
+            </a:r>
+            <a:endParaRPr lang="en-GB" sz="1400" dirty="0"/>
+          </a:p>
+        </p:txBody>
+      </p:sp>
+      <p:sp>
+        <p:nvSpPr>
+          <p:cNvPr id="66" name="TextBox 65"/>
+          <p:cNvSpPr txBox="1"/>
+          <p:nvPr/>
+        </p:nvSpPr>
+        <p:spPr>
+          <a:xfrm>
+            <a:off x="6306636" y="3713890"/>
+            <a:ext cx="2067746" cy="307777"/>
+          </a:xfrm>
+          <a:prstGeom prst="rect">
+            <a:avLst/>
+          </a:prstGeom>
+          <a:noFill/>
+        </p:spPr>
+        <p:txBody>
+          <a:bodyPr wrap="none" rtlCol="0">
+            <a:spAutoFit/>
+          </a:bodyPr>
+          <a:lstStyle/>
+          <a:p>
+            <a:r>
+              <a:rPr lang="en-GB" sz="1400" dirty="0" smtClean="0"/>
+              <a:t>receivePayment(amount)</a:t>
+            </a:r>
+            <a:endParaRPr lang="en-GB" sz="1400" dirty="0"/>
+          </a:p>
+        </p:txBody>
+      </p:sp>
+      <p:cxnSp>
+        <p:nvCxnSpPr>
+          <p:cNvPr id="67" name="Straight Arrow Connector 66"/>
+          <p:cNvCxnSpPr/>
+          <p:nvPr/>
+        </p:nvCxnSpPr>
+        <p:spPr>
+          <a:xfrm>
+            <a:off x="3766286" y="5342708"/>
+            <a:ext cx="2150426" cy="1"/>
+          </a:xfrm>
+          <a:prstGeom prst="straightConnector1">
+            <a:avLst/>
+          </a:prstGeom>
+          <a:ln>
+            <a:headEnd type="stealth" w="lg" len="lg"/>
+            <a:tailEnd type="none" w="lg" len="lg"/>
+          </a:ln>
+        </p:spPr>
+        <p:style>
+          <a:lnRef idx="1">
+            <a:schemeClr val="dk1"/>
+          </a:lnRef>
+          <a:fillRef idx="0">
+            <a:schemeClr val="dk1"/>
+          </a:fillRef>
+          <a:effectRef idx="0">
+            <a:schemeClr val="dk1"/>
+          </a:effectRef>
+          <a:fontRef idx="minor">
+            <a:schemeClr val="tx1"/>
+          </a:fontRef>
+        </p:style>
+      </p:cxnSp>
+      <p:sp>
+        <p:nvSpPr>
+          <p:cNvPr id="72" name="TextBox 71"/>
+          <p:cNvSpPr txBox="1"/>
+          <p:nvPr/>
+        </p:nvSpPr>
+        <p:spPr>
+          <a:xfrm>
+            <a:off x="4661800" y="5034931"/>
+            <a:ext cx="559769" cy="307777"/>
+          </a:xfrm>
+          <a:prstGeom prst="rect">
+            <a:avLst/>
+          </a:prstGeom>
+          <a:noFill/>
+        </p:spPr>
+        <p:txBody>
+          <a:bodyPr wrap="none" rtlCol="0">
+            <a:spAutoFit/>
+          </a:bodyPr>
+          <a:lstStyle/>
+          <a:p>
+            <a:r>
+              <a:rPr lang="en-GB" sz="1400" smtClean="0"/>
+              <a:t>drink</a:t>
+            </a:r>
+            <a:endParaRPr lang="en-GB" sz="1400" dirty="0"/>
+          </a:p>
+        </p:txBody>
+      </p:sp>
     </p:spTree>
     <p:extLst>
       <p:ext uri="{BB962C8B-B14F-4D97-AF65-F5344CB8AC3E}">
-        <p14:creationId xmlns:p14="http://schemas.microsoft.com/office/powerpoint/2010/main" val="53989423"/>
+        <p14:creationId xmlns:p14="http://schemas.microsoft.com/office/powerpoint/2010/main" val="542472523"/>
+      </p:ext>
+    </p:extLst>
+  </p:cSld>
+  <p:clrMapOvr>
+    <a:masterClrMapping/>
+  </p:clrMapOvr>
+</p:sld>
+</file>
+
+<file path=ppt/slides/slide3.xml><?xml version="1.0" encoding="utf-8"?>
+<p:sld xmlns:a="http://schemas.openxmlformats.org/drawingml/2006/main" xmlns:r="http://schemas.openxmlformats.org/officeDocument/2006/relationships" xmlns:p="http://schemas.openxmlformats.org/presentationml/2006/main">
+  <p:cSld>
+    <p:spTree>
+      <p:nvGrpSpPr>
+        <p:cNvPr id="1" name=""/>
+        <p:cNvGrpSpPr/>
+        <p:nvPr/>
+      </p:nvGrpSpPr>
+      <p:grpSpPr>
+        <a:xfrm>
+          <a:off x="0" y="0"/>
+          <a:ext cx="0" cy="0"/>
+          <a:chOff x="0" y="0"/>
+          <a:chExt cx="0" cy="0"/>
+        </a:xfrm>
+      </p:grpSpPr>
+      <p:sp>
+        <p:nvSpPr>
+          <p:cNvPr id="4" name="Rounded Rectangle 3"/>
+          <p:cNvSpPr/>
+          <p:nvPr/>
+        </p:nvSpPr>
+        <p:spPr>
+          <a:xfrm>
+            <a:off x="3042605" y="1679511"/>
+            <a:ext cx="1447364" cy="466530"/>
+          </a:xfrm>
+          <a:prstGeom prst="roundRect">
+            <a:avLst>
+              <a:gd name="adj" fmla="val 23513"/>
+            </a:avLst>
+          </a:prstGeom>
+          <a:noFill/>
+          <a:ln>
+            <a:solidFill>
+              <a:schemeClr val="tx1"/>
+            </a:solidFill>
+          </a:ln>
+        </p:spPr>
+        <p:style>
+          <a:lnRef idx="2">
+            <a:schemeClr val="accent1">
+              <a:shade val="50000"/>
+            </a:schemeClr>
+          </a:lnRef>
+          <a:fillRef idx="1">
+            <a:schemeClr val="accent1"/>
+          </a:fillRef>
+          <a:effectRef idx="0">
+            <a:schemeClr val="accent1"/>
+          </a:effectRef>
+          <a:fontRef idx="minor">
+            <a:schemeClr val="lt1"/>
+          </a:fontRef>
+        </p:style>
+        <p:txBody>
+          <a:bodyPr rtlCol="0" anchor="ctr"/>
+          <a:lstStyle/>
+          <a:p>
+            <a:pPr algn="ctr"/>
+            <a:r>
+              <a:rPr lang="en-GB" dirty="0" smtClean="0">
+                <a:solidFill>
+                  <a:sysClr val="windowText" lastClr="000000"/>
+                </a:solidFill>
+              </a:rPr>
+              <a:t>Customer</a:t>
+            </a:r>
+            <a:endParaRPr lang="en-GB" dirty="0">
+              <a:solidFill>
+                <a:sysClr val="windowText" lastClr="000000"/>
+              </a:solidFill>
+            </a:endParaRPr>
+          </a:p>
+        </p:txBody>
+      </p:sp>
+      <p:sp>
+        <p:nvSpPr>
+          <p:cNvPr id="5" name="Rounded Rectangle 4"/>
+          <p:cNvSpPr/>
+          <p:nvPr/>
+        </p:nvSpPr>
+        <p:spPr>
+          <a:xfrm>
+            <a:off x="5394507" y="1679511"/>
+            <a:ext cx="1447364" cy="466530"/>
+          </a:xfrm>
+          <a:prstGeom prst="roundRect">
+            <a:avLst>
+              <a:gd name="adj" fmla="val 23513"/>
+            </a:avLst>
+          </a:prstGeom>
+          <a:noFill/>
+          <a:ln>
+            <a:solidFill>
+              <a:schemeClr val="tx1"/>
+            </a:solidFill>
+          </a:ln>
+        </p:spPr>
+        <p:style>
+          <a:lnRef idx="2">
+            <a:schemeClr val="accent1">
+              <a:shade val="50000"/>
+            </a:schemeClr>
+          </a:lnRef>
+          <a:fillRef idx="1">
+            <a:schemeClr val="accent1"/>
+          </a:fillRef>
+          <a:effectRef idx="0">
+            <a:schemeClr val="accent1"/>
+          </a:effectRef>
+          <a:fontRef idx="minor">
+            <a:schemeClr val="lt1"/>
+          </a:fontRef>
+        </p:style>
+        <p:txBody>
+          <a:bodyPr rtlCol="0" anchor="ctr"/>
+          <a:lstStyle/>
+          <a:p>
+            <a:pPr algn="ctr"/>
+            <a:r>
+              <a:rPr lang="en-GB" dirty="0" smtClean="0">
+                <a:solidFill>
+                  <a:sysClr val="windowText" lastClr="000000"/>
+                </a:solidFill>
+              </a:rPr>
+              <a:t>ATM</a:t>
+            </a:r>
+            <a:endParaRPr lang="en-GB" dirty="0">
+              <a:solidFill>
+                <a:sysClr val="windowText" lastClr="000000"/>
+              </a:solidFill>
+            </a:endParaRPr>
+          </a:p>
+        </p:txBody>
+      </p:sp>
+      <p:cxnSp>
+        <p:nvCxnSpPr>
+          <p:cNvPr id="6" name="Straight Connector 5"/>
+          <p:cNvCxnSpPr>
+            <a:stCxn id="7" idx="2"/>
+          </p:cNvCxnSpPr>
+          <p:nvPr/>
+        </p:nvCxnSpPr>
+        <p:spPr>
+          <a:xfrm flipH="1">
+            <a:off x="3766286" y="2146041"/>
+            <a:ext cx="1" cy="3586165"/>
+          </a:xfrm>
+          <a:prstGeom prst="line">
+            <a:avLst/>
+          </a:prstGeom>
+          <a:ln>
+            <a:prstDash val="lgDash"/>
+          </a:ln>
+        </p:spPr>
+        <p:style>
+          <a:lnRef idx="1">
+            <a:schemeClr val="dk1"/>
+          </a:lnRef>
+          <a:fillRef idx="0">
+            <a:schemeClr val="dk1"/>
+          </a:fillRef>
+          <a:effectRef idx="0">
+            <a:schemeClr val="dk1"/>
+          </a:effectRef>
+          <a:fontRef idx="minor">
+            <a:schemeClr val="tx1"/>
+          </a:fontRef>
+        </p:style>
+      </p:cxnSp>
+      <p:cxnSp>
+        <p:nvCxnSpPr>
+          <p:cNvPr id="7" name="Straight Connector 6"/>
+          <p:cNvCxnSpPr/>
+          <p:nvPr/>
+        </p:nvCxnSpPr>
+        <p:spPr>
+          <a:xfrm flipH="1">
+            <a:off x="6118188" y="2146041"/>
+            <a:ext cx="1" cy="3586165"/>
+          </a:xfrm>
+          <a:prstGeom prst="line">
+            <a:avLst/>
+          </a:prstGeom>
+          <a:ln>
+            <a:prstDash val="lgDash"/>
+          </a:ln>
+        </p:spPr>
+        <p:style>
+          <a:lnRef idx="1">
+            <a:schemeClr val="dk1"/>
+          </a:lnRef>
+          <a:fillRef idx="0">
+            <a:schemeClr val="dk1"/>
+          </a:fillRef>
+          <a:effectRef idx="0">
+            <a:schemeClr val="dk1"/>
+          </a:effectRef>
+          <a:fontRef idx="minor">
+            <a:schemeClr val="tx1"/>
+          </a:fontRef>
+        </p:style>
+      </p:cxnSp>
+      <p:sp>
+        <p:nvSpPr>
+          <p:cNvPr id="8" name="Rounded Rectangle 7"/>
+          <p:cNvSpPr/>
+          <p:nvPr/>
+        </p:nvSpPr>
+        <p:spPr>
+          <a:xfrm>
+            <a:off x="5926709" y="2733366"/>
+            <a:ext cx="382959" cy="2609343"/>
+          </a:xfrm>
+          <a:prstGeom prst="roundRect">
+            <a:avLst>
+              <a:gd name="adj" fmla="val 0"/>
+            </a:avLst>
+          </a:prstGeom>
+          <a:solidFill>
+            <a:schemeClr val="bg1"/>
+          </a:solidFill>
+          <a:ln>
+            <a:solidFill>
+              <a:schemeClr val="tx1"/>
+            </a:solidFill>
+          </a:ln>
+        </p:spPr>
+        <p:style>
+          <a:lnRef idx="2">
+            <a:schemeClr val="accent1">
+              <a:shade val="50000"/>
+            </a:schemeClr>
+          </a:lnRef>
+          <a:fillRef idx="1">
+            <a:schemeClr val="accent1"/>
+          </a:fillRef>
+          <a:effectRef idx="0">
+            <a:schemeClr val="accent1"/>
+          </a:effectRef>
+          <a:fontRef idx="minor">
+            <a:schemeClr val="lt1"/>
+          </a:fontRef>
+        </p:style>
+        <p:txBody>
+          <a:bodyPr rtlCol="0" anchor="ctr"/>
+          <a:lstStyle/>
+          <a:p>
+            <a:pPr algn="ctr"/>
+            <a:endParaRPr lang="en-GB" dirty="0">
+              <a:solidFill>
+                <a:sysClr val="windowText" lastClr="000000"/>
+              </a:solidFill>
+            </a:endParaRPr>
+          </a:p>
+        </p:txBody>
+      </p:sp>
+      <p:cxnSp>
+        <p:nvCxnSpPr>
+          <p:cNvPr id="9" name="Straight Arrow Connector 8"/>
+          <p:cNvCxnSpPr/>
+          <p:nvPr/>
+        </p:nvCxnSpPr>
+        <p:spPr>
+          <a:xfrm flipH="1">
+            <a:off x="3766288" y="2733366"/>
+            <a:ext cx="2160421" cy="0"/>
+          </a:xfrm>
+          <a:prstGeom prst="straightConnector1">
+            <a:avLst/>
+          </a:prstGeom>
+          <a:ln>
+            <a:headEnd type="stealth" w="lg" len="lg"/>
+            <a:tailEnd type="none" w="lg" len="lg"/>
+          </a:ln>
+        </p:spPr>
+        <p:style>
+          <a:lnRef idx="1">
+            <a:schemeClr val="dk1"/>
+          </a:lnRef>
+          <a:fillRef idx="0">
+            <a:schemeClr val="dk1"/>
+          </a:fillRef>
+          <a:effectRef idx="0">
+            <a:schemeClr val="dk1"/>
+          </a:effectRef>
+          <a:fontRef idx="minor">
+            <a:schemeClr val="tx1"/>
+          </a:fontRef>
+        </p:style>
+      </p:cxnSp>
+      <p:sp>
+        <p:nvSpPr>
+          <p:cNvPr id="16" name="TextBox 15"/>
+          <p:cNvSpPr txBox="1"/>
+          <p:nvPr/>
+        </p:nvSpPr>
+        <p:spPr>
+          <a:xfrm>
+            <a:off x="3834595" y="2444567"/>
+            <a:ext cx="184731" cy="307777"/>
+          </a:xfrm>
+          <a:prstGeom prst="rect">
+            <a:avLst/>
+          </a:prstGeom>
+          <a:noFill/>
+        </p:spPr>
+        <p:txBody>
+          <a:bodyPr wrap="none" rtlCol="0">
+            <a:spAutoFit/>
+          </a:bodyPr>
+          <a:lstStyle/>
+          <a:p>
+            <a:endParaRPr lang="en-GB" sz="1400" dirty="0"/>
+          </a:p>
+        </p:txBody>
+      </p:sp>
+      <p:cxnSp>
+        <p:nvCxnSpPr>
+          <p:cNvPr id="21" name="Straight Arrow Connector 20"/>
+          <p:cNvCxnSpPr/>
+          <p:nvPr/>
+        </p:nvCxnSpPr>
+        <p:spPr>
+          <a:xfrm>
+            <a:off x="3766286" y="5342708"/>
+            <a:ext cx="2150426" cy="1"/>
+          </a:xfrm>
+          <a:prstGeom prst="straightConnector1">
+            <a:avLst/>
+          </a:prstGeom>
+          <a:ln>
+            <a:headEnd type="stealth" w="lg" len="lg"/>
+            <a:tailEnd type="none" w="lg" len="lg"/>
+          </a:ln>
+        </p:spPr>
+        <p:style>
+          <a:lnRef idx="1">
+            <a:schemeClr val="dk1"/>
+          </a:lnRef>
+          <a:fillRef idx="0">
+            <a:schemeClr val="dk1"/>
+          </a:fillRef>
+          <a:effectRef idx="0">
+            <a:schemeClr val="dk1"/>
+          </a:effectRef>
+          <a:fontRef idx="minor">
+            <a:schemeClr val="tx1"/>
+          </a:fontRef>
+        </p:style>
+      </p:cxnSp>
+      <p:sp>
+        <p:nvSpPr>
+          <p:cNvPr id="22" name="TextBox 21"/>
+          <p:cNvSpPr txBox="1"/>
+          <p:nvPr/>
+        </p:nvSpPr>
+        <p:spPr>
+          <a:xfrm>
+            <a:off x="3861912" y="2390283"/>
+            <a:ext cx="2222211" cy="307777"/>
+          </a:xfrm>
+          <a:prstGeom prst="rect">
+            <a:avLst/>
+          </a:prstGeom>
+          <a:noFill/>
+        </p:spPr>
+        <p:txBody>
+          <a:bodyPr wrap="none" rtlCol="0">
+            <a:spAutoFit/>
+          </a:bodyPr>
+          <a:lstStyle/>
+          <a:p>
+            <a:r>
+              <a:rPr lang="en-GB" sz="1400" smtClean="0"/>
+              <a:t>withdrawCash</a:t>
+            </a:r>
+            <a:r>
+              <a:rPr lang="en-GB" sz="1400" dirty="0" smtClean="0"/>
+              <a:t>(pin, amount)</a:t>
+            </a:r>
+            <a:endParaRPr lang="en-GB" sz="1400" dirty="0"/>
+          </a:p>
+        </p:txBody>
+      </p:sp>
+      <p:sp>
+        <p:nvSpPr>
+          <p:cNvPr id="23" name="Rounded Rectangle 22"/>
+          <p:cNvSpPr/>
+          <p:nvPr/>
+        </p:nvSpPr>
+        <p:spPr>
+          <a:xfrm>
+            <a:off x="7746408" y="1679511"/>
+            <a:ext cx="1447364" cy="466530"/>
+          </a:xfrm>
+          <a:prstGeom prst="roundRect">
+            <a:avLst>
+              <a:gd name="adj" fmla="val 23513"/>
+            </a:avLst>
+          </a:prstGeom>
+          <a:noFill/>
+          <a:ln>
+            <a:solidFill>
+              <a:schemeClr val="tx1"/>
+            </a:solidFill>
+          </a:ln>
+        </p:spPr>
+        <p:style>
+          <a:lnRef idx="2">
+            <a:schemeClr val="accent1">
+              <a:shade val="50000"/>
+            </a:schemeClr>
+          </a:lnRef>
+          <a:fillRef idx="1">
+            <a:schemeClr val="accent1"/>
+          </a:fillRef>
+          <a:effectRef idx="0">
+            <a:schemeClr val="accent1"/>
+          </a:effectRef>
+          <a:fontRef idx="minor">
+            <a:schemeClr val="lt1"/>
+          </a:fontRef>
+        </p:style>
+        <p:txBody>
+          <a:bodyPr rtlCol="0" anchor="ctr"/>
+          <a:lstStyle/>
+          <a:p>
+            <a:pPr algn="ctr"/>
+            <a:r>
+              <a:rPr lang="en-GB" dirty="0" err="1" smtClean="0">
+                <a:solidFill>
+                  <a:sysClr val="windowText" lastClr="000000"/>
+                </a:solidFill>
+              </a:rPr>
+              <a:t>BankServer</a:t>
+            </a:r>
+            <a:endParaRPr lang="en-GB" dirty="0">
+              <a:solidFill>
+                <a:sysClr val="windowText" lastClr="000000"/>
+              </a:solidFill>
+            </a:endParaRPr>
+          </a:p>
+        </p:txBody>
+      </p:sp>
+      <p:cxnSp>
+        <p:nvCxnSpPr>
+          <p:cNvPr id="24" name="Straight Connector 23"/>
+          <p:cNvCxnSpPr>
+            <a:stCxn id="23" idx="2"/>
+          </p:cNvCxnSpPr>
+          <p:nvPr/>
+        </p:nvCxnSpPr>
+        <p:spPr>
+          <a:xfrm>
+            <a:off x="8470090" y="2146041"/>
+            <a:ext cx="0" cy="3586165"/>
+          </a:xfrm>
+          <a:prstGeom prst="line">
+            <a:avLst/>
+          </a:prstGeom>
+          <a:ln>
+            <a:prstDash val="lgDash"/>
+          </a:ln>
+        </p:spPr>
+        <p:style>
+          <a:lnRef idx="1">
+            <a:schemeClr val="dk1"/>
+          </a:lnRef>
+          <a:fillRef idx="0">
+            <a:schemeClr val="dk1"/>
+          </a:fillRef>
+          <a:effectRef idx="0">
+            <a:schemeClr val="dk1"/>
+          </a:effectRef>
+          <a:fontRef idx="minor">
+            <a:schemeClr val="tx1"/>
+          </a:fontRef>
+        </p:style>
+      </p:cxnSp>
+      <p:sp>
+        <p:nvSpPr>
+          <p:cNvPr id="27" name="Rounded Rectangle 26"/>
+          <p:cNvSpPr/>
+          <p:nvPr/>
+        </p:nvSpPr>
+        <p:spPr>
+          <a:xfrm>
+            <a:off x="8278610" y="2947187"/>
+            <a:ext cx="382959" cy="684160"/>
+          </a:xfrm>
+          <a:prstGeom prst="roundRect">
+            <a:avLst>
+              <a:gd name="adj" fmla="val 0"/>
+            </a:avLst>
+          </a:prstGeom>
+          <a:solidFill>
+            <a:schemeClr val="bg1"/>
+          </a:solidFill>
+          <a:ln>
+            <a:solidFill>
+              <a:schemeClr val="tx1"/>
+            </a:solidFill>
+          </a:ln>
+        </p:spPr>
+        <p:style>
+          <a:lnRef idx="2">
+            <a:schemeClr val="accent1">
+              <a:shade val="50000"/>
+            </a:schemeClr>
+          </a:lnRef>
+          <a:fillRef idx="1">
+            <a:schemeClr val="accent1"/>
+          </a:fillRef>
+          <a:effectRef idx="0">
+            <a:schemeClr val="accent1"/>
+          </a:effectRef>
+          <a:fontRef idx="minor">
+            <a:schemeClr val="lt1"/>
+          </a:fontRef>
+        </p:style>
+        <p:txBody>
+          <a:bodyPr rtlCol="0" anchor="ctr"/>
+          <a:lstStyle/>
+          <a:p>
+            <a:pPr algn="ctr"/>
+            <a:endParaRPr lang="en-GB" dirty="0">
+              <a:solidFill>
+                <a:sysClr val="windowText" lastClr="000000"/>
+              </a:solidFill>
+            </a:endParaRPr>
+          </a:p>
+        </p:txBody>
+      </p:sp>
+      <p:cxnSp>
+        <p:nvCxnSpPr>
+          <p:cNvPr id="28" name="Straight Arrow Connector 27"/>
+          <p:cNvCxnSpPr/>
+          <p:nvPr/>
+        </p:nvCxnSpPr>
+        <p:spPr>
+          <a:xfrm flipH="1">
+            <a:off x="6309669" y="2947186"/>
+            <a:ext cx="1968941" cy="0"/>
+          </a:xfrm>
+          <a:prstGeom prst="straightConnector1">
+            <a:avLst/>
+          </a:prstGeom>
+          <a:ln>
+            <a:headEnd type="stealth" w="lg" len="lg"/>
+            <a:tailEnd type="none" w="lg" len="lg"/>
+          </a:ln>
+        </p:spPr>
+        <p:style>
+          <a:lnRef idx="1">
+            <a:schemeClr val="dk1"/>
+          </a:lnRef>
+          <a:fillRef idx="0">
+            <a:schemeClr val="dk1"/>
+          </a:fillRef>
+          <a:effectRef idx="0">
+            <a:schemeClr val="dk1"/>
+          </a:effectRef>
+          <a:fontRef idx="minor">
+            <a:schemeClr val="tx1"/>
+          </a:fontRef>
+        </p:style>
+      </p:cxnSp>
+      <p:sp>
+        <p:nvSpPr>
+          <p:cNvPr id="30" name="TextBox 29"/>
+          <p:cNvSpPr txBox="1"/>
+          <p:nvPr/>
+        </p:nvSpPr>
+        <p:spPr>
+          <a:xfrm>
+            <a:off x="6436351" y="2602300"/>
+            <a:ext cx="1816716" cy="307777"/>
+          </a:xfrm>
+          <a:prstGeom prst="rect">
+            <a:avLst/>
+          </a:prstGeom>
+          <a:noFill/>
+        </p:spPr>
+        <p:txBody>
+          <a:bodyPr wrap="none" rtlCol="0">
+            <a:spAutoFit/>
+          </a:bodyPr>
+          <a:lstStyle/>
+          <a:p>
+            <a:r>
+              <a:rPr lang="en-GB" sz="1400" dirty="0" err="1"/>
+              <a:t>a</a:t>
+            </a:r>
+            <a:r>
+              <a:rPr lang="en-GB" sz="1400" dirty="0" err="1" smtClean="0"/>
+              <a:t>uthoriseAccount</a:t>
+            </a:r>
+            <a:r>
+              <a:rPr lang="en-GB" sz="1400" dirty="0" smtClean="0"/>
+              <a:t>(pin)</a:t>
+            </a:r>
+            <a:endParaRPr lang="en-GB" sz="1400" dirty="0"/>
+          </a:p>
+        </p:txBody>
+      </p:sp>
+      <p:cxnSp>
+        <p:nvCxnSpPr>
+          <p:cNvPr id="31" name="Straight Arrow Connector 30"/>
+          <p:cNvCxnSpPr/>
+          <p:nvPr/>
+        </p:nvCxnSpPr>
+        <p:spPr>
+          <a:xfrm>
+            <a:off x="6296808" y="3631346"/>
+            <a:ext cx="1981802" cy="0"/>
+          </a:xfrm>
+          <a:prstGeom prst="straightConnector1">
+            <a:avLst/>
+          </a:prstGeom>
+          <a:ln>
+            <a:headEnd type="stealth" w="lg" len="lg"/>
+            <a:tailEnd type="none" w="lg" len="lg"/>
+          </a:ln>
+        </p:spPr>
+        <p:style>
+          <a:lnRef idx="1">
+            <a:schemeClr val="dk1"/>
+          </a:lnRef>
+          <a:fillRef idx="0">
+            <a:schemeClr val="dk1"/>
+          </a:fillRef>
+          <a:effectRef idx="0">
+            <a:schemeClr val="dk1"/>
+          </a:effectRef>
+          <a:fontRef idx="minor">
+            <a:schemeClr val="tx1"/>
+          </a:fontRef>
+        </p:style>
+      </p:cxnSp>
+      <p:sp>
+        <p:nvSpPr>
+          <p:cNvPr id="34" name="TextBox 33"/>
+          <p:cNvSpPr txBox="1"/>
+          <p:nvPr/>
+        </p:nvSpPr>
+        <p:spPr>
+          <a:xfrm>
+            <a:off x="6657334" y="3343509"/>
+            <a:ext cx="1167307" cy="307777"/>
+          </a:xfrm>
+          <a:prstGeom prst="rect">
+            <a:avLst/>
+          </a:prstGeom>
+          <a:noFill/>
+        </p:spPr>
+        <p:txBody>
+          <a:bodyPr wrap="none" rtlCol="0">
+            <a:spAutoFit/>
+          </a:bodyPr>
+          <a:lstStyle/>
+          <a:p>
+            <a:r>
+              <a:rPr lang="en-GB" sz="1400" dirty="0" smtClean="0"/>
+              <a:t>authorisation</a:t>
+            </a:r>
+            <a:endParaRPr lang="en-GB" sz="1400" dirty="0"/>
+          </a:p>
+        </p:txBody>
+      </p:sp>
+      <p:sp>
+        <p:nvSpPr>
+          <p:cNvPr id="35" name="Rounded Rectangle 34"/>
+          <p:cNvSpPr/>
+          <p:nvPr/>
+        </p:nvSpPr>
+        <p:spPr>
+          <a:xfrm>
+            <a:off x="6118188" y="4526449"/>
+            <a:ext cx="382959" cy="643196"/>
+          </a:xfrm>
+          <a:prstGeom prst="roundRect">
+            <a:avLst>
+              <a:gd name="adj" fmla="val 0"/>
+            </a:avLst>
+          </a:prstGeom>
+          <a:solidFill>
+            <a:schemeClr val="bg1"/>
+          </a:solidFill>
+          <a:ln>
+            <a:solidFill>
+              <a:schemeClr val="tx1"/>
+            </a:solidFill>
+          </a:ln>
+        </p:spPr>
+        <p:style>
+          <a:lnRef idx="2">
+            <a:schemeClr val="accent1">
+              <a:shade val="50000"/>
+            </a:schemeClr>
+          </a:lnRef>
+          <a:fillRef idx="1">
+            <a:schemeClr val="accent1"/>
+          </a:fillRef>
+          <a:effectRef idx="0">
+            <a:schemeClr val="accent1"/>
+          </a:effectRef>
+          <a:fontRef idx="minor">
+            <a:schemeClr val="lt1"/>
+          </a:fontRef>
+        </p:style>
+        <p:txBody>
+          <a:bodyPr rtlCol="0" anchor="ctr"/>
+          <a:lstStyle/>
+          <a:p>
+            <a:pPr algn="ctr"/>
+            <a:endParaRPr lang="en-GB" dirty="0">
+              <a:solidFill>
+                <a:sysClr val="windowText" lastClr="000000"/>
+              </a:solidFill>
+            </a:endParaRPr>
+          </a:p>
+        </p:txBody>
+      </p:sp>
+      <p:sp>
+        <p:nvSpPr>
+          <p:cNvPr id="36" name="TextBox 35"/>
+          <p:cNvSpPr txBox="1"/>
+          <p:nvPr/>
+        </p:nvSpPr>
+        <p:spPr>
+          <a:xfrm>
+            <a:off x="6389514" y="3922821"/>
+            <a:ext cx="1796389" cy="307777"/>
+          </a:xfrm>
+          <a:prstGeom prst="rect">
+            <a:avLst/>
+          </a:prstGeom>
+          <a:noFill/>
+        </p:spPr>
+        <p:txBody>
+          <a:bodyPr wrap="none" rtlCol="0">
+            <a:spAutoFit/>
+          </a:bodyPr>
+          <a:lstStyle/>
+          <a:p>
+            <a:r>
+              <a:rPr lang="en-GB" sz="1400" dirty="0" err="1" smtClean="0"/>
+              <a:t>countMoney</a:t>
+            </a:r>
+            <a:r>
+              <a:rPr lang="en-GB" sz="1400" dirty="0" smtClean="0"/>
+              <a:t>(amount)</a:t>
+            </a:r>
+            <a:endParaRPr lang="en-GB" sz="1400" dirty="0"/>
+          </a:p>
+        </p:txBody>
+      </p:sp>
+      <p:cxnSp>
+        <p:nvCxnSpPr>
+          <p:cNvPr id="38" name="Straight Connector 37"/>
+          <p:cNvCxnSpPr/>
+          <p:nvPr/>
+        </p:nvCxnSpPr>
+        <p:spPr>
+          <a:xfrm>
+            <a:off x="7344709" y="4232516"/>
+            <a:ext cx="0" cy="288469"/>
+          </a:xfrm>
+          <a:prstGeom prst="line">
+            <a:avLst/>
+          </a:prstGeom>
+        </p:spPr>
+        <p:style>
+          <a:lnRef idx="1">
+            <a:schemeClr val="dk1"/>
+          </a:lnRef>
+          <a:fillRef idx="0">
+            <a:schemeClr val="dk1"/>
+          </a:fillRef>
+          <a:effectRef idx="0">
+            <a:schemeClr val="dk1"/>
+          </a:effectRef>
+          <a:fontRef idx="minor">
+            <a:schemeClr val="tx1"/>
+          </a:fontRef>
+        </p:style>
+      </p:cxnSp>
+      <p:cxnSp>
+        <p:nvCxnSpPr>
+          <p:cNvPr id="39" name="Straight Arrow Connector 38"/>
+          <p:cNvCxnSpPr/>
+          <p:nvPr/>
+        </p:nvCxnSpPr>
+        <p:spPr>
+          <a:xfrm>
+            <a:off x="6501147" y="4520985"/>
+            <a:ext cx="843562" cy="0"/>
+          </a:xfrm>
+          <a:prstGeom prst="straightConnector1">
+            <a:avLst/>
+          </a:prstGeom>
+          <a:ln>
+            <a:headEnd type="stealth" w="lg" len="lg"/>
+            <a:tailEnd type="none" w="lg" len="lg"/>
+          </a:ln>
+        </p:spPr>
+        <p:style>
+          <a:lnRef idx="1">
+            <a:schemeClr val="dk1"/>
+          </a:lnRef>
+          <a:fillRef idx="0">
+            <a:schemeClr val="dk1"/>
+          </a:fillRef>
+          <a:effectRef idx="0">
+            <a:schemeClr val="dk1"/>
+          </a:effectRef>
+          <a:fontRef idx="minor">
+            <a:schemeClr val="tx1"/>
+          </a:fontRef>
+        </p:style>
+      </p:cxnSp>
+      <p:cxnSp>
+        <p:nvCxnSpPr>
+          <p:cNvPr id="50" name="Straight Connector 49"/>
+          <p:cNvCxnSpPr/>
+          <p:nvPr/>
+        </p:nvCxnSpPr>
+        <p:spPr>
+          <a:xfrm flipH="1">
+            <a:off x="6309667" y="4232516"/>
+            <a:ext cx="1035042" cy="0"/>
+          </a:xfrm>
+          <a:prstGeom prst="line">
+            <a:avLst/>
+          </a:prstGeom>
+        </p:spPr>
+        <p:style>
+          <a:lnRef idx="1">
+            <a:schemeClr val="dk1"/>
+          </a:lnRef>
+          <a:fillRef idx="0">
+            <a:schemeClr val="dk1"/>
+          </a:fillRef>
+          <a:effectRef idx="0">
+            <a:schemeClr val="dk1"/>
+          </a:effectRef>
+          <a:fontRef idx="minor">
+            <a:schemeClr val="tx1"/>
+          </a:fontRef>
+        </p:style>
+      </p:cxnSp>
+      <p:sp>
+        <p:nvSpPr>
+          <p:cNvPr id="52" name="TextBox 51"/>
+          <p:cNvSpPr txBox="1"/>
+          <p:nvPr/>
+        </p:nvSpPr>
+        <p:spPr>
+          <a:xfrm>
+            <a:off x="4529246" y="5022950"/>
+            <a:ext cx="686919" cy="307777"/>
+          </a:xfrm>
+          <a:prstGeom prst="rect">
+            <a:avLst/>
+          </a:prstGeom>
+          <a:noFill/>
+        </p:spPr>
+        <p:txBody>
+          <a:bodyPr wrap="none" rtlCol="0">
+            <a:spAutoFit/>
+          </a:bodyPr>
+          <a:lstStyle/>
+          <a:p>
+            <a:r>
+              <a:rPr lang="en-GB" sz="1400" dirty="0" smtClean="0"/>
+              <a:t>money</a:t>
+            </a:r>
+            <a:endParaRPr lang="en-GB" sz="1400" dirty="0"/>
+          </a:p>
+        </p:txBody>
+      </p:sp>
+    </p:spTree>
+    <p:extLst>
+      <p:ext uri="{BB962C8B-B14F-4D97-AF65-F5344CB8AC3E}">
+        <p14:creationId xmlns:p14="http://schemas.microsoft.com/office/powerpoint/2010/main" val="914033767"/>
       </p:ext>
     </p:extLst>
   </p:cSld>
@@ -4421,4 +6708,265 @@
     </a:ext>
   </a:extLst>
 </a:theme>
+</file>
+
+<file path=ppt/theme/theme2.xml><?xml version="1.0" encoding="utf-8"?>
+<a:theme xmlns:a="http://schemas.openxmlformats.org/drawingml/2006/main" name="Office Theme">
+  <a:themeElements>
+    <a:clrScheme name="Office">
+      <a:dk1>
+        <a:sysClr val="windowText" lastClr="000000"/>
+      </a:dk1>
+      <a:lt1>
+        <a:sysClr val="window" lastClr="FFFFFF"/>
+      </a:lt1>
+      <a:dk2>
+        <a:srgbClr val="44546A"/>
+      </a:dk2>
+      <a:lt2>
+        <a:srgbClr val="E7E6E6"/>
+      </a:lt2>
+      <a:accent1>
+        <a:srgbClr val="5B9BD5"/>
+      </a:accent1>
+      <a:accent2>
+        <a:srgbClr val="ED7D31"/>
+      </a:accent2>
+      <a:accent3>
+        <a:srgbClr val="A5A5A5"/>
+      </a:accent3>
+      <a:accent4>
+        <a:srgbClr val="FFC000"/>
+      </a:accent4>
+      <a:accent5>
+        <a:srgbClr val="4472C4"/>
+      </a:accent5>
+      <a:accent6>
+        <a:srgbClr val="70AD47"/>
+      </a:accent6>
+      <a:hlink>
+        <a:srgbClr val="0563C1"/>
+      </a:hlink>
+      <a:folHlink>
+        <a:srgbClr val="954F72"/>
+      </a:folHlink>
+    </a:clrScheme>
+    <a:fontScheme name="Office">
+      <a:majorFont>
+        <a:latin typeface="Calibri Light" panose="020F0302020204030204"/>
+        <a:ea typeface=""/>
+        <a:cs typeface=""/>
+        <a:font script="Jpan" typeface="Yu Gothic Light"/>
+        <a:font script="Hang" typeface="맑은 고딕"/>
+        <a:font script="Hans" typeface="DengXian Light"/>
+        <a:font script="Hant" typeface="新細明體"/>
+        <a:font script="Arab" typeface="Times New Roman"/>
+        <a:font script="Hebr" typeface="Times New Roman"/>
+        <a:font script="Thai" typeface="Angsana New"/>
+        <a:font script="Ethi" typeface="Nyala"/>
+        <a:font script="Beng" typeface="Vrinda"/>
+        <a:font script="Gujr" typeface="Shruti"/>
+        <a:font script="Khmr" typeface="MoolBoran"/>
+        <a:font script="Knda" typeface="Tunga"/>
+        <a:font script="Guru" typeface="Raavi"/>
+        <a:font script="Cans" typeface="Euphemia"/>
+        <a:font script="Cher" typeface="Plantagenet Cherokee"/>
+        <a:font script="Yiii" typeface="Microsoft Yi Baiti"/>
+        <a:font script="Tibt" typeface="Microsoft Himalaya"/>
+        <a:font script="Thaa" typeface="MV Boli"/>
+        <a:font script="Deva" typeface="Mangal"/>
+        <a:font script="Telu" typeface="Gautami"/>
+        <a:font script="Taml" typeface="Latha"/>
+        <a:font script="Syrc" typeface="Estrangelo Edessa"/>
+        <a:font script="Orya" typeface="Kalinga"/>
+        <a:font script="Mlym" typeface="Kartika"/>
+        <a:font script="Laoo" typeface="DokChampa"/>
+        <a:font script="Sinh" typeface="Iskoola Pota"/>
+        <a:font script="Mong" typeface="Mongolian Baiti"/>
+        <a:font script="Viet" typeface="Times New Roman"/>
+        <a:font script="Uigh" typeface="Microsoft Uighur"/>
+        <a:font script="Geor" typeface="Sylfaen"/>
+      </a:majorFont>
+      <a:minorFont>
+        <a:latin typeface="Calibri" panose="020F0502020204030204"/>
+        <a:ea typeface=""/>
+        <a:cs typeface=""/>
+        <a:font script="Jpan" typeface="Yu Gothic"/>
+        <a:font script="Hang" typeface="맑은 고딕"/>
+        <a:font script="Hans" typeface="DengXian"/>
+        <a:font script="Hant" typeface="新細明體"/>
+        <a:font script="Arab" typeface="Arial"/>
+        <a:font script="Hebr" typeface="Arial"/>
+        <a:font script="Thai" typeface="Cordia New"/>
+        <a:font script="Ethi" typeface="Nyala"/>
+        <a:font script="Beng" typeface="Vrinda"/>
+        <a:font script="Gujr" typeface="Shruti"/>
+        <a:font script="Khmr" typeface="DaunPenh"/>
+        <a:font script="Knda" typeface="Tunga"/>
+        <a:font script="Guru" typeface="Raavi"/>
+        <a:font script="Cans" typeface="Euphemia"/>
+        <a:font script="Cher" typeface="Plantagenet Cherokee"/>
+        <a:font script="Yiii" typeface="Microsoft Yi Baiti"/>
+        <a:font script="Tibt" typeface="Microsoft Himalaya"/>
+        <a:font script="Thaa" typeface="MV Boli"/>
+        <a:font script="Deva" typeface="Mangal"/>
+        <a:font script="Telu" typeface="Gautami"/>
+        <a:font script="Taml" typeface="Latha"/>
+        <a:font script="Syrc" typeface="Estrangelo Edessa"/>
+        <a:font script="Orya" typeface="Kalinga"/>
+        <a:font script="Mlym" typeface="Kartika"/>
+        <a:font script="Laoo" typeface="DokChampa"/>
+        <a:font script="Sinh" typeface="Iskoola Pota"/>
+        <a:font script="Mong" typeface="Mongolian Baiti"/>
+        <a:font script="Viet" typeface="Arial"/>
+        <a:font script="Uigh" typeface="Microsoft Uighur"/>
+        <a:font script="Geor" typeface="Sylfaen"/>
+      </a:minorFont>
+    </a:fontScheme>
+    <a:fmtScheme name="Office">
+      <a:fillStyleLst>
+        <a:solidFill>
+          <a:schemeClr val="phClr"/>
+        </a:solidFill>
+        <a:gradFill rotWithShape="1">
+          <a:gsLst>
+            <a:gs pos="0">
+              <a:schemeClr val="phClr">
+                <a:lumMod val="110000"/>
+                <a:satMod val="105000"/>
+                <a:tint val="67000"/>
+              </a:schemeClr>
+            </a:gs>
+            <a:gs pos="50000">
+              <a:schemeClr val="phClr">
+                <a:lumMod val="105000"/>
+                <a:satMod val="103000"/>
+                <a:tint val="73000"/>
+              </a:schemeClr>
+            </a:gs>
+            <a:gs pos="100000">
+              <a:schemeClr val="phClr">
+                <a:lumMod val="105000"/>
+                <a:satMod val="109000"/>
+                <a:tint val="81000"/>
+              </a:schemeClr>
+            </a:gs>
+          </a:gsLst>
+          <a:lin ang="5400000" scaled="0"/>
+        </a:gradFill>
+        <a:gradFill rotWithShape="1">
+          <a:gsLst>
+            <a:gs pos="0">
+              <a:schemeClr val="phClr">
+                <a:satMod val="103000"/>
+                <a:lumMod val="102000"/>
+                <a:tint val="94000"/>
+              </a:schemeClr>
+            </a:gs>
+            <a:gs pos="50000">
+              <a:schemeClr val="phClr">
+                <a:satMod val="110000"/>
+                <a:lumMod val="100000"/>
+                <a:shade val="100000"/>
+              </a:schemeClr>
+            </a:gs>
+            <a:gs pos="100000">
+              <a:schemeClr val="phClr">
+                <a:lumMod val="99000"/>
+                <a:satMod val="120000"/>
+                <a:shade val="78000"/>
+              </a:schemeClr>
+            </a:gs>
+          </a:gsLst>
+          <a:lin ang="5400000" scaled="0"/>
+        </a:gradFill>
+      </a:fillStyleLst>
+      <a:lnStyleLst>
+        <a:ln w="6350" cap="flat" cmpd="sng" algn="ctr">
+          <a:solidFill>
+            <a:schemeClr val="phClr"/>
+          </a:solidFill>
+          <a:prstDash val="solid"/>
+          <a:miter lim="800000"/>
+        </a:ln>
+        <a:ln w="12700" cap="flat" cmpd="sng" algn="ctr">
+          <a:solidFill>
+            <a:schemeClr val="phClr"/>
+          </a:solidFill>
+          <a:prstDash val="solid"/>
+          <a:miter lim="800000"/>
+        </a:ln>
+        <a:ln w="19050" cap="flat" cmpd="sng" algn="ctr">
+          <a:solidFill>
+            <a:schemeClr val="phClr"/>
+          </a:solidFill>
+          <a:prstDash val="solid"/>
+          <a:miter lim="800000"/>
+        </a:ln>
+      </a:lnStyleLst>
+      <a:effectStyleLst>
+        <a:effectStyle>
+          <a:effectLst/>
+        </a:effectStyle>
+        <a:effectStyle>
+          <a:effectLst/>
+        </a:effectStyle>
+        <a:effectStyle>
+          <a:effectLst>
+            <a:outerShdw blurRad="57150" dist="19050" dir="5400000" algn="ctr" rotWithShape="0">
+              <a:srgbClr val="000000">
+                <a:alpha val="63000"/>
+              </a:srgbClr>
+            </a:outerShdw>
+          </a:effectLst>
+        </a:effectStyle>
+      </a:effectStyleLst>
+      <a:bgFillStyleLst>
+        <a:solidFill>
+          <a:schemeClr val="phClr"/>
+        </a:solidFill>
+        <a:solidFill>
+          <a:schemeClr val="phClr">
+            <a:tint val="95000"/>
+            <a:satMod val="170000"/>
+          </a:schemeClr>
+        </a:solidFill>
+        <a:gradFill rotWithShape="1">
+          <a:gsLst>
+            <a:gs pos="0">
+              <a:schemeClr val="phClr">
+                <a:tint val="93000"/>
+                <a:satMod val="150000"/>
+                <a:shade val="98000"/>
+                <a:lumMod val="102000"/>
+              </a:schemeClr>
+            </a:gs>
+            <a:gs pos="50000">
+              <a:schemeClr val="phClr">
+                <a:tint val="98000"/>
+                <a:satMod val="130000"/>
+                <a:shade val="90000"/>
+                <a:lumMod val="103000"/>
+              </a:schemeClr>
+            </a:gs>
+            <a:gs pos="100000">
+              <a:schemeClr val="phClr">
+                <a:shade val="63000"/>
+                <a:satMod val="120000"/>
+              </a:schemeClr>
+            </a:gs>
+          </a:gsLst>
+          <a:lin ang="5400000" scaled="0"/>
+        </a:gradFill>
+      </a:bgFillStyleLst>
+    </a:fmtScheme>
+  </a:themeElements>
+  <a:objectDefaults/>
+  <a:extraClrSchemeLst/>
+  <a:extLst>
+    <a:ext uri="{05A4C25C-085E-4340-85A3-A5531E510DB2}">
+      <thm15:themeFamily xmlns:thm15="http://schemas.microsoft.com/office/thememl/2012/main" name="Office Theme" id="{62F939B6-93AF-4DB8-9C6B-D6C7DFDC589F}" vid="{4A3C46E8-61CC-4603-A589-7422A47A8E4A}"/>
+    </a:ext>
+  </a:extLst>
+</a:theme>
 </file>
</xml_diff>